<commit_message>
Imagenes y formato al ppt
</commit_message>
<xml_diff>
--- a/theCoolerPpt.pptx
+++ b/theCoolerPpt.pptx
@@ -2,7 +2,7 @@
 <file path=ppt/presentation.xml><?xml version="1.0" encoding="utf-8"?>
 <p:presentation xmlns:a="http://schemas.openxmlformats.org/drawingml/2006/main" xmlns:r="http://schemas.openxmlformats.org/officeDocument/2006/relationships" xmlns:p="http://schemas.openxmlformats.org/presentationml/2006/main" saveSubsetFonts="1">
   <p:sldMasterIdLst>
-    <p:sldMasterId id="2147483648" r:id="rId1"/>
+    <p:sldMasterId id="2147483768" r:id="rId1"/>
   </p:sldMasterIdLst>
   <p:sldIdLst>
     <p:sldId id="256" r:id="rId2"/>
@@ -132,7 +132,7 @@
       </p:grpSpPr>
       <p:sp>
         <p:nvSpPr>
-          <p:cNvPr id="2" name="1 Título"/>
+          <p:cNvPr id="2" name="Title 1"/>
           <p:cNvSpPr>
             <a:spLocks noGrp="1"/>
           </p:cNvSpPr>
@@ -142,25 +142,34 @@
         </p:nvSpPr>
         <p:spPr>
           <a:xfrm>
-            <a:off x="685800" y="2130425"/>
-            <a:ext cx="7772400" cy="1470025"/>
+            <a:off x="685800" y="609601"/>
+            <a:ext cx="7772400" cy="4267200"/>
           </a:xfrm>
         </p:spPr>
         <p:txBody>
-          <a:bodyPr/>
-          <a:lstStyle/>
+          <a:bodyPr anchor="b">
+            <a:noAutofit/>
+          </a:bodyPr>
+          <a:lstStyle>
+            <a:lvl1pPr>
+              <a:lnSpc>
+                <a:spcPct val="100000"/>
+              </a:lnSpc>
+              <a:defRPr sz="8000"/>
+            </a:lvl1pPr>
+          </a:lstStyle>
           <a:p>
             <a:r>
               <a:rPr lang="es-ES" smtClean="0"/>
               <a:t>Haga clic para modificar el estilo de título del patrón</a:t>
             </a:r>
-            <a:endParaRPr lang="es-ES"/>
-          </a:p>
-        </p:txBody>
-      </p:sp>
-      <p:sp>
-        <p:nvSpPr>
-          <p:cNvPr id="3" name="2 Subtítulo"/>
+            <a:endParaRPr lang="en-US" dirty="0"/>
+          </a:p>
+        </p:txBody>
+      </p:sp>
+      <p:sp>
+        <p:nvSpPr>
+          <p:cNvPr id="3" name="Subtitle 2"/>
           <p:cNvSpPr>
             <a:spLocks noGrp="1"/>
           </p:cNvSpPr>
@@ -170,16 +179,18 @@
         </p:nvSpPr>
         <p:spPr>
           <a:xfrm>
-            <a:off x="1371600" y="3886200"/>
-            <a:ext cx="6400800" cy="1752600"/>
+            <a:off x="1371600" y="4953000"/>
+            <a:ext cx="6400800" cy="1219200"/>
           </a:xfrm>
         </p:spPr>
         <p:txBody>
-          <a:bodyPr/>
+          <a:bodyPr>
+            <a:normAutofit/>
+          </a:bodyPr>
           <a:lstStyle>
             <a:lvl1pPr marL="0" indent="0" algn="ctr">
               <a:buNone/>
-              <a:defRPr>
+              <a:defRPr sz="2400">
                 <a:solidFill>
                   <a:schemeClr val="tx1">
                     <a:tint val="75000"/>
@@ -273,13 +284,13 @@
               <a:rPr lang="es-ES" smtClean="0"/>
               <a:t>Haga clic para modificar el estilo de subtítulo del patrón</a:t>
             </a:r>
-            <a:endParaRPr lang="es-ES"/>
-          </a:p>
-        </p:txBody>
-      </p:sp>
-      <p:sp>
-        <p:nvSpPr>
-          <p:cNvPr id="4" name="3 Marcador de fecha"/>
+            <a:endParaRPr lang="en-US" dirty="0"/>
+          </a:p>
+        </p:txBody>
+      </p:sp>
+      <p:sp>
+        <p:nvSpPr>
+          <p:cNvPr id="7" name="Date Placeholder 6"/>
           <p:cNvSpPr>
             <a:spLocks noGrp="1"/>
           </p:cNvSpPr>
@@ -294,7 +305,7 @@
           <a:p>
             <a:fld id="{7A847CFC-816F-41D0-AAC0-9BF4FEBC753E}" type="datetimeFigureOut">
               <a:rPr lang="es-ES" smtClean="0"/>
-              <a:t>16/06/2019</a:t>
+              <a:t>17/06/2019</a:t>
             </a:fld>
             <a:endParaRPr lang="es-ES"/>
           </a:p>
@@ -302,31 +313,12 @@
       </p:sp>
       <p:sp>
         <p:nvSpPr>
-          <p:cNvPr id="5" name="4 Marcador de pie de página"/>
-          <p:cNvSpPr>
-            <a:spLocks noGrp="1"/>
-          </p:cNvSpPr>
-          <p:nvPr>
-            <p:ph type="ftr" sz="quarter" idx="11"/>
-          </p:nvPr>
-        </p:nvSpPr>
-        <p:spPr/>
-        <p:txBody>
-          <a:bodyPr/>
-          <a:lstStyle/>
-          <a:p>
-            <a:endParaRPr lang="es-ES"/>
-          </a:p>
-        </p:txBody>
-      </p:sp>
-      <p:sp>
-        <p:nvSpPr>
-          <p:cNvPr id="6" name="5 Marcador de número de diapositiva"/>
-          <p:cNvSpPr>
-            <a:spLocks noGrp="1"/>
-          </p:cNvSpPr>
-          <p:nvPr>
-            <p:ph type="sldNum" sz="quarter" idx="12"/>
+          <p:cNvPr id="8" name="Slide Number Placeholder 7"/>
+          <p:cNvSpPr>
+            <a:spLocks noGrp="1"/>
+          </p:cNvSpPr>
+          <p:nvPr>
+            <p:ph type="sldNum" sz="quarter" idx="11"/>
           </p:nvPr>
         </p:nvSpPr>
         <p:spPr/>
@@ -338,6 +330,25 @@
               <a:rPr lang="es-ES" smtClean="0"/>
               <a:t>‹Nº›</a:t>
             </a:fld>
+            <a:endParaRPr lang="es-ES"/>
+          </a:p>
+        </p:txBody>
+      </p:sp>
+      <p:sp>
+        <p:nvSpPr>
+          <p:cNvPr id="9" name="Footer Placeholder 8"/>
+          <p:cNvSpPr>
+            <a:spLocks noGrp="1"/>
+          </p:cNvSpPr>
+          <p:nvPr>
+            <p:ph type="ftr" sz="quarter" idx="12"/>
+          </p:nvPr>
+        </p:nvSpPr>
+        <p:spPr/>
+        <p:txBody>
+          <a:bodyPr/>
+          <a:lstStyle/>
+          <a:p>
             <a:endParaRPr lang="es-ES"/>
           </a:p>
         </p:txBody>
@@ -369,7 +380,7 @@
       </p:grpSpPr>
       <p:sp>
         <p:nvSpPr>
-          <p:cNvPr id="2" name="1 Título"/>
+          <p:cNvPr id="2" name="Title 1"/>
           <p:cNvSpPr>
             <a:spLocks noGrp="1"/>
           </p:cNvSpPr>
@@ -386,13 +397,13 @@
               <a:rPr lang="es-ES" smtClean="0"/>
               <a:t>Haga clic para modificar el estilo de título del patrón</a:t>
             </a:r>
-            <a:endParaRPr lang="es-ES"/>
-          </a:p>
-        </p:txBody>
-      </p:sp>
-      <p:sp>
-        <p:nvSpPr>
-          <p:cNvPr id="3" name="2 Marcador de texto vertical"/>
+            <a:endParaRPr lang="en-US" dirty="0"/>
+          </a:p>
+        </p:txBody>
+      </p:sp>
+      <p:sp>
+        <p:nvSpPr>
+          <p:cNvPr id="3" name="Vertical Text Placeholder 2"/>
           <p:cNvSpPr>
             <a:spLocks noGrp="1"/>
           </p:cNvSpPr>
@@ -438,13 +449,13 @@
               <a:rPr lang="es-ES" smtClean="0"/>
               <a:t>Quinto nivel</a:t>
             </a:r>
-            <a:endParaRPr lang="es-ES"/>
-          </a:p>
-        </p:txBody>
-      </p:sp>
-      <p:sp>
-        <p:nvSpPr>
-          <p:cNvPr id="4" name="3 Marcador de fecha"/>
+            <a:endParaRPr lang="en-US"/>
+          </a:p>
+        </p:txBody>
+      </p:sp>
+      <p:sp>
+        <p:nvSpPr>
+          <p:cNvPr id="4" name="Date Placeholder 3"/>
           <p:cNvSpPr>
             <a:spLocks noGrp="1"/>
           </p:cNvSpPr>
@@ -459,7 +470,7 @@
           <a:p>
             <a:fld id="{7A847CFC-816F-41D0-AAC0-9BF4FEBC753E}" type="datetimeFigureOut">
               <a:rPr lang="es-ES" smtClean="0"/>
-              <a:t>16/06/2019</a:t>
+              <a:t>17/06/2019</a:t>
             </a:fld>
             <a:endParaRPr lang="es-ES"/>
           </a:p>
@@ -467,7 +478,7 @@
       </p:sp>
       <p:sp>
         <p:nvSpPr>
-          <p:cNvPr id="5" name="4 Marcador de pie de página"/>
+          <p:cNvPr id="5" name="Footer Placeholder 4"/>
           <p:cNvSpPr>
             <a:spLocks noGrp="1"/>
           </p:cNvSpPr>
@@ -486,7 +497,7 @@
       </p:sp>
       <p:sp>
         <p:nvSpPr>
-          <p:cNvPr id="6" name="5 Marcador de número de diapositiva"/>
+          <p:cNvPr id="6" name="Slide Number Placeholder 5"/>
           <p:cNvSpPr>
             <a:spLocks noGrp="1"/>
           </p:cNvSpPr>
@@ -534,7 +545,7 @@
       </p:grpSpPr>
       <p:sp>
         <p:nvSpPr>
-          <p:cNvPr id="2" name="1 Título vertical"/>
+          <p:cNvPr id="2" name="Vertical Title 1"/>
           <p:cNvSpPr>
             <a:spLocks noGrp="1"/>
           </p:cNvSpPr>
@@ -556,13 +567,13 @@
               <a:rPr lang="es-ES" smtClean="0"/>
               <a:t>Haga clic para modificar el estilo de título del patrón</a:t>
             </a:r>
-            <a:endParaRPr lang="es-ES"/>
-          </a:p>
-        </p:txBody>
-      </p:sp>
-      <p:sp>
-        <p:nvSpPr>
-          <p:cNvPr id="3" name="2 Marcador de texto vertical"/>
+            <a:endParaRPr lang="en-US" dirty="0"/>
+          </a:p>
+        </p:txBody>
+      </p:sp>
+      <p:sp>
+        <p:nvSpPr>
+          <p:cNvPr id="3" name="Vertical Text Placeholder 2"/>
           <p:cNvSpPr>
             <a:spLocks noGrp="1"/>
           </p:cNvSpPr>
@@ -613,13 +624,13 @@
               <a:rPr lang="es-ES" smtClean="0"/>
               <a:t>Quinto nivel</a:t>
             </a:r>
-            <a:endParaRPr lang="es-ES"/>
-          </a:p>
-        </p:txBody>
-      </p:sp>
-      <p:sp>
-        <p:nvSpPr>
-          <p:cNvPr id="4" name="3 Marcador de fecha"/>
+            <a:endParaRPr lang="en-US"/>
+          </a:p>
+        </p:txBody>
+      </p:sp>
+      <p:sp>
+        <p:nvSpPr>
+          <p:cNvPr id="4" name="Date Placeholder 3"/>
           <p:cNvSpPr>
             <a:spLocks noGrp="1"/>
           </p:cNvSpPr>
@@ -634,7 +645,7 @@
           <a:p>
             <a:fld id="{7A847CFC-816F-41D0-AAC0-9BF4FEBC753E}" type="datetimeFigureOut">
               <a:rPr lang="es-ES" smtClean="0"/>
-              <a:t>16/06/2019</a:t>
+              <a:t>17/06/2019</a:t>
             </a:fld>
             <a:endParaRPr lang="es-ES"/>
           </a:p>
@@ -642,7 +653,7 @@
       </p:sp>
       <p:sp>
         <p:nvSpPr>
-          <p:cNvPr id="5" name="4 Marcador de pie de página"/>
+          <p:cNvPr id="5" name="Footer Placeholder 4"/>
           <p:cNvSpPr>
             <a:spLocks noGrp="1"/>
           </p:cNvSpPr>
@@ -661,7 +672,7 @@
       </p:sp>
       <p:sp>
         <p:nvSpPr>
-          <p:cNvPr id="6" name="5 Marcador de número de diapositiva"/>
+          <p:cNvPr id="6" name="Slide Number Placeholder 5"/>
           <p:cNvSpPr>
             <a:spLocks noGrp="1"/>
           </p:cNvSpPr>
@@ -709,7 +720,7 @@
       </p:grpSpPr>
       <p:sp>
         <p:nvSpPr>
-          <p:cNvPr id="2" name="1 Título"/>
+          <p:cNvPr id="2" name="Title 1"/>
           <p:cNvSpPr>
             <a:spLocks noGrp="1"/>
           </p:cNvSpPr>
@@ -726,13 +737,13 @@
               <a:rPr lang="es-ES" smtClean="0"/>
               <a:t>Haga clic para modificar el estilo de título del patrón</a:t>
             </a:r>
-            <a:endParaRPr lang="es-ES"/>
-          </a:p>
-        </p:txBody>
-      </p:sp>
-      <p:sp>
-        <p:nvSpPr>
-          <p:cNvPr id="3" name="2 Marcador de contenido"/>
+            <a:endParaRPr lang="en-US" dirty="0"/>
+          </a:p>
+        </p:txBody>
+      </p:sp>
+      <p:sp>
+        <p:nvSpPr>
+          <p:cNvPr id="3" name="Content Placeholder 2"/>
           <p:cNvSpPr>
             <a:spLocks noGrp="1"/>
           </p:cNvSpPr>
@@ -743,7 +754,25 @@
         <p:spPr/>
         <p:txBody>
           <a:bodyPr/>
-          <a:lstStyle/>
+          <a:lstStyle>
+            <a:lvl5pPr>
+              <a:defRPr/>
+            </a:lvl5pPr>
+            <a:lvl6pPr>
+              <a:defRPr/>
+            </a:lvl6pPr>
+            <a:lvl7pPr>
+              <a:defRPr/>
+            </a:lvl7pPr>
+            <a:lvl8pPr>
+              <a:defRPr/>
+            </a:lvl8pPr>
+            <a:lvl9pPr>
+              <a:buFont typeface="Arial" pitchFamily="34" charset="0"/>
+              <a:buChar char="•"/>
+              <a:defRPr/>
+            </a:lvl9pPr>
+          </a:lstStyle>
           <a:p>
             <a:pPr lvl="0"/>
             <a:r>
@@ -778,13 +807,13 @@
               <a:rPr lang="es-ES" smtClean="0"/>
               <a:t>Quinto nivel</a:t>
             </a:r>
-            <a:endParaRPr lang="es-ES"/>
-          </a:p>
-        </p:txBody>
-      </p:sp>
-      <p:sp>
-        <p:nvSpPr>
-          <p:cNvPr id="4" name="3 Marcador de fecha"/>
+            <a:endParaRPr lang="en-US" dirty="0" smtClean="0"/>
+          </a:p>
+        </p:txBody>
+      </p:sp>
+      <p:sp>
+        <p:nvSpPr>
+          <p:cNvPr id="4" name="Date Placeholder 3"/>
           <p:cNvSpPr>
             <a:spLocks noGrp="1"/>
           </p:cNvSpPr>
@@ -799,7 +828,7 @@
           <a:p>
             <a:fld id="{7A847CFC-816F-41D0-AAC0-9BF4FEBC753E}" type="datetimeFigureOut">
               <a:rPr lang="es-ES" smtClean="0"/>
-              <a:t>16/06/2019</a:t>
+              <a:t>17/06/2019</a:t>
             </a:fld>
             <a:endParaRPr lang="es-ES"/>
           </a:p>
@@ -807,7 +836,7 @@
       </p:sp>
       <p:sp>
         <p:nvSpPr>
-          <p:cNvPr id="5" name="4 Marcador de pie de página"/>
+          <p:cNvPr id="5" name="Footer Placeholder 4"/>
           <p:cNvSpPr>
             <a:spLocks noGrp="1"/>
           </p:cNvSpPr>
@@ -826,7 +855,7 @@
       </p:sp>
       <p:sp>
         <p:nvSpPr>
-          <p:cNvPr id="6" name="5 Marcador de número de diapositiva"/>
+          <p:cNvPr id="6" name="Slide Number Placeholder 5"/>
           <p:cNvSpPr>
             <a:spLocks noGrp="1"/>
           </p:cNvSpPr>
@@ -874,7 +903,7 @@
       </p:grpSpPr>
       <p:sp>
         <p:nvSpPr>
-          <p:cNvPr id="2" name="1 Título"/>
+          <p:cNvPr id="2" name="Title 1"/>
           <p:cNvSpPr>
             <a:spLocks noGrp="1"/>
           </p:cNvSpPr>
@@ -884,46 +913,67 @@
         </p:nvSpPr>
         <p:spPr>
           <a:xfrm>
-            <a:off x="722313" y="4406900"/>
-            <a:ext cx="7772400" cy="1362075"/>
+            <a:off x="722313" y="1371600"/>
+            <a:ext cx="7772400" cy="2505075"/>
           </a:xfrm>
         </p:spPr>
         <p:txBody>
+          <a:bodyPr anchor="b"/>
+          <a:lstStyle>
+            <a:lvl1pPr algn="ctr" defTabSz="914400" rtl="0" eaLnBrk="1" latinLnBrk="0" hangingPunct="1">
+              <a:lnSpc>
+                <a:spcPct val="100000"/>
+              </a:lnSpc>
+              <a:spcBef>
+                <a:spcPct val="0"/>
+              </a:spcBef>
+              <a:buNone/>
+              <a:defRPr lang="en-US" sz="4800" kern="1200" dirty="0" smtClean="0">
+                <a:solidFill>
+                  <a:schemeClr val="tx2"/>
+                </a:solidFill>
+                <a:effectLst>
+                  <a:outerShdw blurRad="63500" dist="38100" dir="5400000" algn="t" rotWithShape="0">
+                    <a:prstClr val="black">
+                      <a:alpha val="25000"/>
+                    </a:prstClr>
+                  </a:outerShdw>
+                </a:effectLst>
+                <a:latin typeface="+mn-lt"/>
+                <a:ea typeface="+mj-ea"/>
+                <a:cs typeface="+mj-cs"/>
+              </a:defRPr>
+            </a:lvl1pPr>
+          </a:lstStyle>
+          <a:p>
+            <a:r>
+              <a:rPr lang="es-ES" smtClean="0"/>
+              <a:t>Haga clic para modificar el estilo de título del patrón</a:t>
+            </a:r>
+            <a:endParaRPr lang="en-US" dirty="0"/>
+          </a:p>
+        </p:txBody>
+      </p:sp>
+      <p:sp>
+        <p:nvSpPr>
+          <p:cNvPr id="3" name="Text Placeholder 2"/>
+          <p:cNvSpPr>
+            <a:spLocks noGrp="1"/>
+          </p:cNvSpPr>
+          <p:nvPr>
+            <p:ph type="body" idx="1"/>
+          </p:nvPr>
+        </p:nvSpPr>
+        <p:spPr>
+          <a:xfrm>
+            <a:off x="722313" y="4068763"/>
+            <a:ext cx="7772400" cy="1131887"/>
+          </a:xfrm>
+        </p:spPr>
+        <p:txBody>
           <a:bodyPr anchor="t"/>
           <a:lstStyle>
-            <a:lvl1pPr algn="l">
-              <a:defRPr sz="4000" b="1" cap="all"/>
-            </a:lvl1pPr>
-          </a:lstStyle>
-          <a:p>
-            <a:r>
-              <a:rPr lang="es-ES" smtClean="0"/>
-              <a:t>Haga clic para modificar el estilo de título del patrón</a:t>
-            </a:r>
-            <a:endParaRPr lang="es-ES"/>
-          </a:p>
-        </p:txBody>
-      </p:sp>
-      <p:sp>
-        <p:nvSpPr>
-          <p:cNvPr id="3" name="2 Marcador de texto"/>
-          <p:cNvSpPr>
-            <a:spLocks noGrp="1"/>
-          </p:cNvSpPr>
-          <p:nvPr>
-            <p:ph type="body" idx="1"/>
-          </p:nvPr>
-        </p:nvSpPr>
-        <p:spPr>
-          <a:xfrm>
-            <a:off x="722313" y="2906713"/>
-            <a:ext cx="7772400" cy="1500187"/>
-          </a:xfrm>
-        </p:spPr>
-        <p:txBody>
-          <a:bodyPr anchor="b"/>
-          <a:lstStyle>
-            <a:lvl1pPr marL="0" indent="0">
+            <a:lvl1pPr marL="0" indent="0" algn="ctr">
               <a:buNone/>
               <a:defRPr sz="2000">
                 <a:solidFill>
@@ -1025,7 +1075,7 @@
       </p:sp>
       <p:sp>
         <p:nvSpPr>
-          <p:cNvPr id="4" name="3 Marcador de fecha"/>
+          <p:cNvPr id="4" name="Date Placeholder 3"/>
           <p:cNvSpPr>
             <a:spLocks noGrp="1"/>
           </p:cNvSpPr>
@@ -1040,7 +1090,7 @@
           <a:p>
             <a:fld id="{7A847CFC-816F-41D0-AAC0-9BF4FEBC753E}" type="datetimeFigureOut">
               <a:rPr lang="es-ES" smtClean="0"/>
-              <a:t>16/06/2019</a:t>
+              <a:t>17/06/2019</a:t>
             </a:fld>
             <a:endParaRPr lang="es-ES"/>
           </a:p>
@@ -1048,7 +1098,7 @@
       </p:sp>
       <p:sp>
         <p:nvSpPr>
-          <p:cNvPr id="5" name="4 Marcador de pie de página"/>
+          <p:cNvPr id="5" name="Footer Placeholder 4"/>
           <p:cNvSpPr>
             <a:spLocks noGrp="1"/>
           </p:cNvSpPr>
@@ -1067,7 +1117,7 @@
       </p:sp>
       <p:sp>
         <p:nvSpPr>
-          <p:cNvPr id="6" name="5 Marcador de número de diapositiva"/>
+          <p:cNvPr id="6" name="Slide Number Placeholder 5"/>
           <p:cNvSpPr>
             <a:spLocks noGrp="1"/>
           </p:cNvSpPr>
@@ -1085,6 +1135,156 @@
               <a:t>‹Nº›</a:t>
             </a:fld>
             <a:endParaRPr lang="es-ES"/>
+          </a:p>
+        </p:txBody>
+      </p:sp>
+      <p:sp>
+        <p:nvSpPr>
+          <p:cNvPr id="7" name="Oval 6"/>
+          <p:cNvSpPr/>
+          <p:nvPr/>
+        </p:nvSpPr>
+        <p:spPr>
+          <a:xfrm>
+            <a:off x="4495800" y="3924300"/>
+            <a:ext cx="84772" cy="84772"/>
+          </a:xfrm>
+          <a:prstGeom prst="ellipse">
+            <a:avLst/>
+          </a:prstGeom>
+          <a:solidFill>
+            <a:schemeClr val="tx1">
+              <a:lumMod val="50000"/>
+              <a:lumOff val="50000"/>
+            </a:schemeClr>
+          </a:solidFill>
+          <a:ln w="12700">
+            <a:noFill/>
+          </a:ln>
+          <a:effectLst/>
+        </p:spPr>
+        <p:style>
+          <a:lnRef idx="2">
+            <a:schemeClr val="accent1">
+              <a:shade val="50000"/>
+            </a:schemeClr>
+          </a:lnRef>
+          <a:fillRef idx="1">
+            <a:schemeClr val="accent1"/>
+          </a:fillRef>
+          <a:effectRef idx="0">
+            <a:schemeClr val="accent1"/>
+          </a:effectRef>
+          <a:fontRef idx="minor">
+            <a:schemeClr val="lt1"/>
+          </a:fontRef>
+        </p:style>
+        <p:txBody>
+          <a:bodyPr rtlCol="0" anchor="ctr"/>
+          <a:lstStyle/>
+          <a:p>
+            <a:pPr algn="ctr"/>
+            <a:endParaRPr lang="en-US"/>
+          </a:p>
+        </p:txBody>
+      </p:sp>
+      <p:sp>
+        <p:nvSpPr>
+          <p:cNvPr id="8" name="Oval 7"/>
+          <p:cNvSpPr/>
+          <p:nvPr/>
+        </p:nvSpPr>
+        <p:spPr>
+          <a:xfrm>
+            <a:off x="4695825" y="3924300"/>
+            <a:ext cx="84772" cy="84772"/>
+          </a:xfrm>
+          <a:prstGeom prst="ellipse">
+            <a:avLst/>
+          </a:prstGeom>
+          <a:solidFill>
+            <a:schemeClr val="tx1">
+              <a:lumMod val="50000"/>
+              <a:lumOff val="50000"/>
+            </a:schemeClr>
+          </a:solidFill>
+          <a:ln w="12700">
+            <a:noFill/>
+          </a:ln>
+          <a:effectLst/>
+        </p:spPr>
+        <p:style>
+          <a:lnRef idx="2">
+            <a:schemeClr val="accent1">
+              <a:shade val="50000"/>
+            </a:schemeClr>
+          </a:lnRef>
+          <a:fillRef idx="1">
+            <a:schemeClr val="accent1"/>
+          </a:fillRef>
+          <a:effectRef idx="0">
+            <a:schemeClr val="accent1"/>
+          </a:effectRef>
+          <a:fontRef idx="minor">
+            <a:schemeClr val="lt1"/>
+          </a:fontRef>
+        </p:style>
+        <p:txBody>
+          <a:bodyPr rtlCol="0" anchor="ctr"/>
+          <a:lstStyle/>
+          <a:p>
+            <a:pPr algn="ctr"/>
+            <a:endParaRPr lang="en-US"/>
+          </a:p>
+        </p:txBody>
+      </p:sp>
+      <p:sp>
+        <p:nvSpPr>
+          <p:cNvPr id="9" name="Oval 8"/>
+          <p:cNvSpPr/>
+          <p:nvPr/>
+        </p:nvSpPr>
+        <p:spPr>
+          <a:xfrm>
+            <a:off x="4296728" y="3924300"/>
+            <a:ext cx="84772" cy="84772"/>
+          </a:xfrm>
+          <a:prstGeom prst="ellipse">
+            <a:avLst/>
+          </a:prstGeom>
+          <a:solidFill>
+            <a:schemeClr val="tx1">
+              <a:lumMod val="50000"/>
+              <a:lumOff val="50000"/>
+            </a:schemeClr>
+          </a:solidFill>
+          <a:ln w="12700">
+            <a:noFill/>
+          </a:ln>
+          <a:effectLst/>
+        </p:spPr>
+        <p:style>
+          <a:lnRef idx="2">
+            <a:schemeClr val="accent1">
+              <a:shade val="50000"/>
+            </a:schemeClr>
+          </a:lnRef>
+          <a:fillRef idx="1">
+            <a:schemeClr val="accent1"/>
+          </a:fillRef>
+          <a:effectRef idx="0">
+            <a:schemeClr val="accent1"/>
+          </a:effectRef>
+          <a:fontRef idx="minor">
+            <a:schemeClr val="lt1"/>
+          </a:fontRef>
+        </p:style>
+        <p:txBody>
+          <a:bodyPr rtlCol="0" anchor="ctr"/>
+          <a:lstStyle/>
+          <a:p>
+            <a:pPr algn="ctr"/>
+            <a:endParaRPr lang="en-US"/>
           </a:p>
         </p:txBody>
       </p:sp>
@@ -1115,7 +1315,7 @@
       </p:grpSpPr>
       <p:sp>
         <p:nvSpPr>
-          <p:cNvPr id="2" name="1 Título"/>
+          <p:cNvPr id="2" name="Title 1"/>
           <p:cNvSpPr>
             <a:spLocks noGrp="1"/>
           </p:cNvSpPr>
@@ -1132,98 +1332,13 @@
               <a:rPr lang="es-ES" smtClean="0"/>
               <a:t>Haga clic para modificar el estilo de título del patrón</a:t>
             </a:r>
-            <a:endParaRPr lang="es-ES"/>
-          </a:p>
-        </p:txBody>
-      </p:sp>
-      <p:sp>
-        <p:nvSpPr>
-          <p:cNvPr id="3" name="2 Marcador de contenido"/>
-          <p:cNvSpPr>
-            <a:spLocks noGrp="1"/>
-          </p:cNvSpPr>
-          <p:nvPr>
-            <p:ph sz="half" idx="1"/>
-          </p:nvPr>
-        </p:nvSpPr>
-        <p:spPr>
-          <a:xfrm>
-            <a:off x="457200" y="1600200"/>
-            <a:ext cx="4038600" cy="4525963"/>
-          </a:xfrm>
-        </p:spPr>
-        <p:txBody>
-          <a:bodyPr/>
-          <a:lstStyle>
-            <a:lvl1pPr>
-              <a:defRPr sz="2800"/>
-            </a:lvl1pPr>
-            <a:lvl2pPr>
-              <a:defRPr sz="2400"/>
-            </a:lvl2pPr>
-            <a:lvl3pPr>
-              <a:defRPr sz="2000"/>
-            </a:lvl3pPr>
-            <a:lvl4pPr>
-              <a:defRPr sz="1800"/>
-            </a:lvl4pPr>
-            <a:lvl5pPr>
-              <a:defRPr sz="1800"/>
-            </a:lvl5pPr>
-            <a:lvl6pPr>
-              <a:defRPr sz="1800"/>
-            </a:lvl6pPr>
-            <a:lvl7pPr>
-              <a:defRPr sz="1800"/>
-            </a:lvl7pPr>
-            <a:lvl8pPr>
-              <a:defRPr sz="1800"/>
-            </a:lvl8pPr>
-            <a:lvl9pPr>
-              <a:defRPr sz="1800"/>
-            </a:lvl9pPr>
-          </a:lstStyle>
-          <a:p>
-            <a:pPr lvl="0"/>
-            <a:r>
-              <a:rPr lang="es-ES" smtClean="0"/>
-              <a:t>Haga clic para modificar el estilo de texto del patrón</a:t>
-            </a:r>
-          </a:p>
-          <a:p>
-            <a:pPr lvl="1"/>
-            <a:r>
-              <a:rPr lang="es-ES" smtClean="0"/>
-              <a:t>Segundo nivel</a:t>
-            </a:r>
-          </a:p>
-          <a:p>
-            <a:pPr lvl="2"/>
-            <a:r>
-              <a:rPr lang="es-ES" smtClean="0"/>
-              <a:t>Tercer nivel</a:t>
-            </a:r>
-          </a:p>
-          <a:p>
-            <a:pPr lvl="3"/>
-            <a:r>
-              <a:rPr lang="es-ES" smtClean="0"/>
-              <a:t>Cuarto nivel</a:t>
-            </a:r>
-          </a:p>
-          <a:p>
-            <a:pPr lvl="4"/>
-            <a:r>
-              <a:rPr lang="es-ES" smtClean="0"/>
-              <a:t>Quinto nivel</a:t>
-            </a:r>
-            <a:endParaRPr lang="es-ES"/>
-          </a:p>
-        </p:txBody>
-      </p:sp>
-      <p:sp>
-        <p:nvSpPr>
-          <p:cNvPr id="4" name="3 Marcador de contenido"/>
+            <a:endParaRPr lang="en-US"/>
+          </a:p>
+        </p:txBody>
+      </p:sp>
+      <p:sp>
+        <p:nvSpPr>
+          <p:cNvPr id="4" name="Content Placeholder 3"/>
           <p:cNvSpPr>
             <a:spLocks noGrp="1"/>
           </p:cNvSpPr>
@@ -1241,31 +1356,31 @@
           <a:bodyPr/>
           <a:lstStyle>
             <a:lvl1pPr>
-              <a:defRPr sz="2800"/>
+              <a:defRPr sz="2400"/>
             </a:lvl1pPr>
             <a:lvl2pPr>
-              <a:defRPr sz="2400"/>
+              <a:defRPr sz="1600"/>
             </a:lvl2pPr>
             <a:lvl3pPr>
-              <a:defRPr sz="2000"/>
+              <a:defRPr sz="1600"/>
             </a:lvl3pPr>
             <a:lvl4pPr>
-              <a:defRPr sz="1800"/>
+              <a:defRPr sz="1600"/>
             </a:lvl4pPr>
             <a:lvl5pPr>
-              <a:defRPr sz="1800"/>
+              <a:defRPr sz="1600"/>
             </a:lvl5pPr>
             <a:lvl6pPr>
-              <a:defRPr sz="1800"/>
+              <a:defRPr sz="1600"/>
             </a:lvl6pPr>
             <a:lvl7pPr>
-              <a:defRPr sz="1800"/>
+              <a:defRPr sz="1600"/>
             </a:lvl7pPr>
             <a:lvl8pPr>
-              <a:defRPr sz="1800"/>
+              <a:defRPr sz="1600"/>
             </a:lvl8pPr>
             <a:lvl9pPr>
-              <a:defRPr sz="1800"/>
+              <a:defRPr sz="1600"/>
             </a:lvl9pPr>
           </a:lstStyle>
           <a:p>
@@ -1302,13 +1417,13 @@
               <a:rPr lang="es-ES" smtClean="0"/>
               <a:t>Quinto nivel</a:t>
             </a:r>
-            <a:endParaRPr lang="es-ES"/>
-          </a:p>
-        </p:txBody>
-      </p:sp>
-      <p:sp>
-        <p:nvSpPr>
-          <p:cNvPr id="5" name="4 Marcador de fecha"/>
+            <a:endParaRPr lang="en-US" dirty="0" smtClean="0"/>
+          </a:p>
+        </p:txBody>
+      </p:sp>
+      <p:sp>
+        <p:nvSpPr>
+          <p:cNvPr id="5" name="Date Placeholder 4"/>
           <p:cNvSpPr>
             <a:spLocks noGrp="1"/>
           </p:cNvSpPr>
@@ -1323,7 +1438,7 @@
           <a:p>
             <a:fld id="{7A847CFC-816F-41D0-AAC0-9BF4FEBC753E}" type="datetimeFigureOut">
               <a:rPr lang="es-ES" smtClean="0"/>
-              <a:t>16/06/2019</a:t>
+              <a:t>17/06/2019</a:t>
             </a:fld>
             <a:endParaRPr lang="es-ES"/>
           </a:p>
@@ -1331,7 +1446,7 @@
       </p:sp>
       <p:sp>
         <p:nvSpPr>
-          <p:cNvPr id="6" name="5 Marcador de pie de página"/>
+          <p:cNvPr id="6" name="Footer Placeholder 5"/>
           <p:cNvSpPr>
             <a:spLocks noGrp="1"/>
           </p:cNvSpPr>
@@ -1350,7 +1465,7 @@
       </p:sp>
       <p:sp>
         <p:nvSpPr>
-          <p:cNvPr id="7" name="6 Marcador de número de diapositiva"/>
+          <p:cNvPr id="7" name="Slide Number Placeholder 6"/>
           <p:cNvSpPr>
             <a:spLocks noGrp="1"/>
           </p:cNvSpPr>
@@ -1368,6 +1483,63 @@
               <a:t>‹Nº›</a:t>
             </a:fld>
             <a:endParaRPr lang="es-ES"/>
+          </a:p>
+        </p:txBody>
+      </p:sp>
+      <p:sp>
+        <p:nvSpPr>
+          <p:cNvPr id="9" name="Content Placeholder 8"/>
+          <p:cNvSpPr>
+            <a:spLocks noGrp="1"/>
+          </p:cNvSpPr>
+          <p:nvPr>
+            <p:ph sz="quarter" idx="13"/>
+          </p:nvPr>
+        </p:nvSpPr>
+        <p:spPr>
+          <a:xfrm>
+            <a:off x="365760" y="1600200"/>
+            <a:ext cx="4041648" cy="4526280"/>
+          </a:xfrm>
+        </p:spPr>
+        <p:txBody>
+          <a:bodyPr/>
+          <a:lstStyle/>
+          <a:p>
+            <a:pPr lvl="0"/>
+            <a:r>
+              <a:rPr lang="es-ES" smtClean="0"/>
+              <a:t>Haga clic para modificar el estilo de texto del patrón</a:t>
+            </a:r>
+          </a:p>
+          <a:p>
+            <a:pPr lvl="1"/>
+            <a:r>
+              <a:rPr lang="es-ES" smtClean="0"/>
+              <a:t>Segundo nivel</a:t>
+            </a:r>
+          </a:p>
+          <a:p>
+            <a:pPr lvl="2"/>
+            <a:r>
+              <a:rPr lang="es-ES" smtClean="0"/>
+              <a:t>Tercer nivel</a:t>
+            </a:r>
+          </a:p>
+          <a:p>
+            <a:pPr lvl="3"/>
+            <a:r>
+              <a:rPr lang="es-ES" smtClean="0"/>
+              <a:t>Cuarto nivel</a:t>
+            </a:r>
+          </a:p>
+          <a:p>
+            <a:pPr lvl="4"/>
+            <a:r>
+              <a:rPr lang="es-ES" smtClean="0"/>
+              <a:t>Quinto nivel</a:t>
+            </a:r>
+            <a:endParaRPr lang="en-US"/>
           </a:p>
         </p:txBody>
       </p:sp>
@@ -1398,7 +1570,7 @@
       </p:grpSpPr>
       <p:sp>
         <p:nvSpPr>
-          <p:cNvPr id="2" name="1 Título"/>
+          <p:cNvPr id="2" name="Title 1"/>
           <p:cNvSpPr>
             <a:spLocks noGrp="1"/>
           </p:cNvSpPr>
@@ -1419,13 +1591,13 @@
               <a:rPr lang="es-ES" smtClean="0"/>
               <a:t>Haga clic para modificar el estilo de título del patrón</a:t>
             </a:r>
-            <a:endParaRPr lang="es-ES"/>
-          </a:p>
-        </p:txBody>
-      </p:sp>
-      <p:sp>
-        <p:nvSpPr>
-          <p:cNvPr id="3" name="2 Marcador de texto"/>
+            <a:endParaRPr lang="en-US"/>
+          </a:p>
+        </p:txBody>
+      </p:sp>
+      <p:sp>
+        <p:nvSpPr>
+          <p:cNvPr id="3" name="Text Placeholder 2"/>
           <p:cNvSpPr>
             <a:spLocks noGrp="1"/>
           </p:cNvSpPr>
@@ -1435,16 +1607,18 @@
         </p:nvSpPr>
         <p:spPr>
           <a:xfrm>
-            <a:off x="457200" y="1535113"/>
-            <a:ext cx="4040188" cy="639762"/>
+            <a:off x="457200" y="1600200"/>
+            <a:ext cx="4040188" cy="609600"/>
           </a:xfrm>
         </p:spPr>
         <p:txBody>
-          <a:bodyPr anchor="b"/>
+          <a:bodyPr anchor="b">
+            <a:noAutofit/>
+          </a:bodyPr>
           <a:lstStyle>
-            <a:lvl1pPr marL="0" indent="0">
-              <a:buNone/>
-              <a:defRPr sz="2400" b="1"/>
+            <a:lvl1pPr marL="0" indent="0" algn="ctr">
+              <a:buNone/>
+              <a:defRPr sz="2400" b="0"/>
             </a:lvl1pPr>
             <a:lvl2pPr marL="457200" indent="0">
               <a:buNone/>
@@ -1490,111 +1664,28 @@
       </p:sp>
       <p:sp>
         <p:nvSpPr>
-          <p:cNvPr id="4" name="3 Marcador de contenido"/>
-          <p:cNvSpPr>
-            <a:spLocks noGrp="1"/>
-          </p:cNvSpPr>
-          <p:nvPr>
-            <p:ph sz="half" idx="2"/>
+          <p:cNvPr id="5" name="Text Placeholder 4"/>
+          <p:cNvSpPr>
+            <a:spLocks noGrp="1"/>
+          </p:cNvSpPr>
+          <p:nvPr>
+            <p:ph type="body" sz="quarter" idx="3"/>
           </p:nvPr>
         </p:nvSpPr>
         <p:spPr>
           <a:xfrm>
-            <a:off x="457200" y="2174875"/>
-            <a:ext cx="4040188" cy="3951288"/>
+            <a:off x="4648200" y="1600200"/>
+            <a:ext cx="4041775" cy="609600"/>
           </a:xfrm>
         </p:spPr>
         <p:txBody>
-          <a:bodyPr/>
+          <a:bodyPr anchor="b">
+            <a:noAutofit/>
+          </a:bodyPr>
           <a:lstStyle>
-            <a:lvl1pPr>
-              <a:defRPr sz="2400"/>
-            </a:lvl1pPr>
-            <a:lvl2pPr>
-              <a:defRPr sz="2000"/>
-            </a:lvl2pPr>
-            <a:lvl3pPr>
-              <a:defRPr sz="1800"/>
-            </a:lvl3pPr>
-            <a:lvl4pPr>
-              <a:defRPr sz="1600"/>
-            </a:lvl4pPr>
-            <a:lvl5pPr>
-              <a:defRPr sz="1600"/>
-            </a:lvl5pPr>
-            <a:lvl6pPr>
-              <a:defRPr sz="1600"/>
-            </a:lvl6pPr>
-            <a:lvl7pPr>
-              <a:defRPr sz="1600"/>
-            </a:lvl7pPr>
-            <a:lvl8pPr>
-              <a:defRPr sz="1600"/>
-            </a:lvl8pPr>
-            <a:lvl9pPr>
-              <a:defRPr sz="1600"/>
-            </a:lvl9pPr>
-          </a:lstStyle>
-          <a:p>
-            <a:pPr lvl="0"/>
-            <a:r>
-              <a:rPr lang="es-ES" smtClean="0"/>
-              <a:t>Haga clic para modificar el estilo de texto del patrón</a:t>
-            </a:r>
-          </a:p>
-          <a:p>
-            <a:pPr lvl="1"/>
-            <a:r>
-              <a:rPr lang="es-ES" smtClean="0"/>
-              <a:t>Segundo nivel</a:t>
-            </a:r>
-          </a:p>
-          <a:p>
-            <a:pPr lvl="2"/>
-            <a:r>
-              <a:rPr lang="es-ES" smtClean="0"/>
-              <a:t>Tercer nivel</a:t>
-            </a:r>
-          </a:p>
-          <a:p>
-            <a:pPr lvl="3"/>
-            <a:r>
-              <a:rPr lang="es-ES" smtClean="0"/>
-              <a:t>Cuarto nivel</a:t>
-            </a:r>
-          </a:p>
-          <a:p>
-            <a:pPr lvl="4"/>
-            <a:r>
-              <a:rPr lang="es-ES" smtClean="0"/>
-              <a:t>Quinto nivel</a:t>
-            </a:r>
-            <a:endParaRPr lang="es-ES"/>
-          </a:p>
-        </p:txBody>
-      </p:sp>
-      <p:sp>
-        <p:nvSpPr>
-          <p:cNvPr id="5" name="4 Marcador de texto"/>
-          <p:cNvSpPr>
-            <a:spLocks noGrp="1"/>
-          </p:cNvSpPr>
-          <p:nvPr>
-            <p:ph type="body" sz="quarter" idx="3"/>
-          </p:nvPr>
-        </p:nvSpPr>
-        <p:spPr>
-          <a:xfrm>
-            <a:off x="4645025" y="1535113"/>
-            <a:ext cx="4041775" cy="639762"/>
-          </a:xfrm>
-        </p:spPr>
-        <p:txBody>
-          <a:bodyPr anchor="b"/>
-          <a:lstStyle>
-            <a:lvl1pPr marL="0" indent="0">
-              <a:buNone/>
-              <a:defRPr sz="2400" b="1"/>
+            <a:lvl1pPr marL="0" indent="0" algn="ctr">
+              <a:buNone/>
+              <a:defRPr sz="2400" b="0"/>
             </a:lvl1pPr>
             <a:lvl2pPr marL="457200" indent="0">
               <a:buNone/>
@@ -1640,92 +1731,7 @@
       </p:sp>
       <p:sp>
         <p:nvSpPr>
-          <p:cNvPr id="6" name="5 Marcador de contenido"/>
-          <p:cNvSpPr>
-            <a:spLocks noGrp="1"/>
-          </p:cNvSpPr>
-          <p:nvPr>
-            <p:ph sz="quarter" idx="4"/>
-          </p:nvPr>
-        </p:nvSpPr>
-        <p:spPr>
-          <a:xfrm>
-            <a:off x="4645025" y="2174875"/>
-            <a:ext cx="4041775" cy="3951288"/>
-          </a:xfrm>
-        </p:spPr>
-        <p:txBody>
-          <a:bodyPr/>
-          <a:lstStyle>
-            <a:lvl1pPr>
-              <a:defRPr sz="2400"/>
-            </a:lvl1pPr>
-            <a:lvl2pPr>
-              <a:defRPr sz="2000"/>
-            </a:lvl2pPr>
-            <a:lvl3pPr>
-              <a:defRPr sz="1800"/>
-            </a:lvl3pPr>
-            <a:lvl4pPr>
-              <a:defRPr sz="1600"/>
-            </a:lvl4pPr>
-            <a:lvl5pPr>
-              <a:defRPr sz="1600"/>
-            </a:lvl5pPr>
-            <a:lvl6pPr>
-              <a:defRPr sz="1600"/>
-            </a:lvl6pPr>
-            <a:lvl7pPr>
-              <a:defRPr sz="1600"/>
-            </a:lvl7pPr>
-            <a:lvl8pPr>
-              <a:defRPr sz="1600"/>
-            </a:lvl8pPr>
-            <a:lvl9pPr>
-              <a:defRPr sz="1600"/>
-            </a:lvl9pPr>
-          </a:lstStyle>
-          <a:p>
-            <a:pPr lvl="0"/>
-            <a:r>
-              <a:rPr lang="es-ES" smtClean="0"/>
-              <a:t>Haga clic para modificar el estilo de texto del patrón</a:t>
-            </a:r>
-          </a:p>
-          <a:p>
-            <a:pPr lvl="1"/>
-            <a:r>
-              <a:rPr lang="es-ES" smtClean="0"/>
-              <a:t>Segundo nivel</a:t>
-            </a:r>
-          </a:p>
-          <a:p>
-            <a:pPr lvl="2"/>
-            <a:r>
-              <a:rPr lang="es-ES" smtClean="0"/>
-              <a:t>Tercer nivel</a:t>
-            </a:r>
-          </a:p>
-          <a:p>
-            <a:pPr lvl="3"/>
-            <a:r>
-              <a:rPr lang="es-ES" smtClean="0"/>
-              <a:t>Cuarto nivel</a:t>
-            </a:r>
-          </a:p>
-          <a:p>
-            <a:pPr lvl="4"/>
-            <a:r>
-              <a:rPr lang="es-ES" smtClean="0"/>
-              <a:t>Quinto nivel</a:t>
-            </a:r>
-            <a:endParaRPr lang="es-ES"/>
-          </a:p>
-        </p:txBody>
-      </p:sp>
-      <p:sp>
-        <p:nvSpPr>
-          <p:cNvPr id="7" name="6 Marcador de fecha"/>
+          <p:cNvPr id="7" name="Date Placeholder 6"/>
           <p:cNvSpPr>
             <a:spLocks noGrp="1"/>
           </p:cNvSpPr>
@@ -1740,7 +1746,7 @@
           <a:p>
             <a:fld id="{7A847CFC-816F-41D0-AAC0-9BF4FEBC753E}" type="datetimeFigureOut">
               <a:rPr lang="es-ES" smtClean="0"/>
-              <a:t>16/06/2019</a:t>
+              <a:t>17/06/2019</a:t>
             </a:fld>
             <a:endParaRPr lang="es-ES"/>
           </a:p>
@@ -1748,7 +1754,7 @@
       </p:sp>
       <p:sp>
         <p:nvSpPr>
-          <p:cNvPr id="8" name="7 Marcador de pie de página"/>
+          <p:cNvPr id="8" name="Footer Placeholder 7"/>
           <p:cNvSpPr>
             <a:spLocks noGrp="1"/>
           </p:cNvSpPr>
@@ -1767,7 +1773,7 @@
       </p:sp>
       <p:sp>
         <p:nvSpPr>
-          <p:cNvPr id="9" name="8 Marcador de número de diapositiva"/>
+          <p:cNvPr id="9" name="Slide Number Placeholder 8"/>
           <p:cNvSpPr>
             <a:spLocks noGrp="1"/>
           </p:cNvSpPr>
@@ -1785,6 +1791,120 @@
               <a:t>‹Nº›</a:t>
             </a:fld>
             <a:endParaRPr lang="es-ES"/>
+          </a:p>
+        </p:txBody>
+      </p:sp>
+      <p:sp>
+        <p:nvSpPr>
+          <p:cNvPr id="11" name="Content Placeholder 10"/>
+          <p:cNvSpPr>
+            <a:spLocks noGrp="1"/>
+          </p:cNvSpPr>
+          <p:nvPr>
+            <p:ph sz="quarter" idx="13"/>
+          </p:nvPr>
+        </p:nvSpPr>
+        <p:spPr>
+          <a:xfrm>
+            <a:off x="457200" y="2212848"/>
+            <a:ext cx="4041648" cy="3913632"/>
+          </a:xfrm>
+        </p:spPr>
+        <p:txBody>
+          <a:bodyPr/>
+          <a:lstStyle/>
+          <a:p>
+            <a:pPr lvl="0"/>
+            <a:r>
+              <a:rPr lang="es-ES" smtClean="0"/>
+              <a:t>Haga clic para modificar el estilo de texto del patrón</a:t>
+            </a:r>
+          </a:p>
+          <a:p>
+            <a:pPr lvl="1"/>
+            <a:r>
+              <a:rPr lang="es-ES" smtClean="0"/>
+              <a:t>Segundo nivel</a:t>
+            </a:r>
+          </a:p>
+          <a:p>
+            <a:pPr lvl="2"/>
+            <a:r>
+              <a:rPr lang="es-ES" smtClean="0"/>
+              <a:t>Tercer nivel</a:t>
+            </a:r>
+          </a:p>
+          <a:p>
+            <a:pPr lvl="3"/>
+            <a:r>
+              <a:rPr lang="es-ES" smtClean="0"/>
+              <a:t>Cuarto nivel</a:t>
+            </a:r>
+          </a:p>
+          <a:p>
+            <a:pPr lvl="4"/>
+            <a:r>
+              <a:rPr lang="es-ES" smtClean="0"/>
+              <a:t>Quinto nivel</a:t>
+            </a:r>
+            <a:endParaRPr lang="en-US" dirty="0"/>
+          </a:p>
+        </p:txBody>
+      </p:sp>
+      <p:sp>
+        <p:nvSpPr>
+          <p:cNvPr id="13" name="Content Placeholder 12"/>
+          <p:cNvSpPr>
+            <a:spLocks noGrp="1"/>
+          </p:cNvSpPr>
+          <p:nvPr>
+            <p:ph sz="quarter" idx="14"/>
+          </p:nvPr>
+        </p:nvSpPr>
+        <p:spPr>
+          <a:xfrm>
+            <a:off x="4672584" y="2212848"/>
+            <a:ext cx="4041648" cy="3913187"/>
+          </a:xfrm>
+        </p:spPr>
+        <p:txBody>
+          <a:bodyPr/>
+          <a:lstStyle/>
+          <a:p>
+            <a:pPr lvl="0"/>
+            <a:r>
+              <a:rPr lang="es-ES" smtClean="0"/>
+              <a:t>Haga clic para modificar el estilo de texto del patrón</a:t>
+            </a:r>
+          </a:p>
+          <a:p>
+            <a:pPr lvl="1"/>
+            <a:r>
+              <a:rPr lang="es-ES" smtClean="0"/>
+              <a:t>Segundo nivel</a:t>
+            </a:r>
+          </a:p>
+          <a:p>
+            <a:pPr lvl="2"/>
+            <a:r>
+              <a:rPr lang="es-ES" smtClean="0"/>
+              <a:t>Tercer nivel</a:t>
+            </a:r>
+          </a:p>
+          <a:p>
+            <a:pPr lvl="3"/>
+            <a:r>
+              <a:rPr lang="es-ES" smtClean="0"/>
+              <a:t>Cuarto nivel</a:t>
+            </a:r>
+          </a:p>
+          <a:p>
+            <a:pPr lvl="4"/>
+            <a:r>
+              <a:rPr lang="es-ES" smtClean="0"/>
+              <a:t>Quinto nivel</a:t>
+            </a:r>
+            <a:endParaRPr lang="en-US" dirty="0"/>
           </a:p>
         </p:txBody>
       </p:sp>
@@ -1815,7 +1935,7 @@
       </p:grpSpPr>
       <p:sp>
         <p:nvSpPr>
-          <p:cNvPr id="2" name="1 Título"/>
+          <p:cNvPr id="2" name="Title 1"/>
           <p:cNvSpPr>
             <a:spLocks noGrp="1"/>
           </p:cNvSpPr>
@@ -1832,13 +1952,13 @@
               <a:rPr lang="es-ES" smtClean="0"/>
               <a:t>Haga clic para modificar el estilo de título del patrón</a:t>
             </a:r>
-            <a:endParaRPr lang="es-ES"/>
-          </a:p>
-        </p:txBody>
-      </p:sp>
-      <p:sp>
-        <p:nvSpPr>
-          <p:cNvPr id="3" name="2 Marcador de fecha"/>
+            <a:endParaRPr lang="en-US" dirty="0"/>
+          </a:p>
+        </p:txBody>
+      </p:sp>
+      <p:sp>
+        <p:nvSpPr>
+          <p:cNvPr id="3" name="Date Placeholder 2"/>
           <p:cNvSpPr>
             <a:spLocks noGrp="1"/>
           </p:cNvSpPr>
@@ -1853,7 +1973,7 @@
           <a:p>
             <a:fld id="{7A847CFC-816F-41D0-AAC0-9BF4FEBC753E}" type="datetimeFigureOut">
               <a:rPr lang="es-ES" smtClean="0"/>
-              <a:t>16/06/2019</a:t>
+              <a:t>17/06/2019</a:t>
             </a:fld>
             <a:endParaRPr lang="es-ES"/>
           </a:p>
@@ -1861,7 +1981,7 @@
       </p:sp>
       <p:sp>
         <p:nvSpPr>
-          <p:cNvPr id="4" name="3 Marcador de pie de página"/>
+          <p:cNvPr id="4" name="Footer Placeholder 3"/>
           <p:cNvSpPr>
             <a:spLocks noGrp="1"/>
           </p:cNvSpPr>
@@ -1880,7 +2000,7 @@
       </p:sp>
       <p:sp>
         <p:nvSpPr>
-          <p:cNvPr id="5" name="4 Marcador de número de diapositiva"/>
+          <p:cNvPr id="5" name="Slide Number Placeholder 4"/>
           <p:cNvSpPr>
             <a:spLocks noGrp="1"/>
           </p:cNvSpPr>
@@ -1928,7 +2048,7 @@
       </p:grpSpPr>
       <p:sp>
         <p:nvSpPr>
-          <p:cNvPr id="2" name="1 Marcador de fecha"/>
+          <p:cNvPr id="2" name="Date Placeholder 1"/>
           <p:cNvSpPr>
             <a:spLocks noGrp="1"/>
           </p:cNvSpPr>
@@ -1943,7 +2063,7 @@
           <a:p>
             <a:fld id="{7A847CFC-816F-41D0-AAC0-9BF4FEBC753E}" type="datetimeFigureOut">
               <a:rPr lang="es-ES" smtClean="0"/>
-              <a:t>16/06/2019</a:t>
+              <a:t>17/06/2019</a:t>
             </a:fld>
             <a:endParaRPr lang="es-ES"/>
           </a:p>
@@ -1951,7 +2071,7 @@
       </p:sp>
       <p:sp>
         <p:nvSpPr>
-          <p:cNvPr id="3" name="2 Marcador de pie de página"/>
+          <p:cNvPr id="3" name="Footer Placeholder 2"/>
           <p:cNvSpPr>
             <a:spLocks noGrp="1"/>
           </p:cNvSpPr>
@@ -1970,7 +2090,7 @@
       </p:sp>
       <p:sp>
         <p:nvSpPr>
-          <p:cNvPr id="4" name="3 Marcador de número de diapositiva"/>
+          <p:cNvPr id="4" name="Slide Number Placeholder 3"/>
           <p:cNvSpPr>
             <a:spLocks noGrp="1"/>
           </p:cNvSpPr>
@@ -2018,7 +2138,7 @@
       </p:grpSpPr>
       <p:sp>
         <p:nvSpPr>
-          <p:cNvPr id="2" name="1 Título"/>
+          <p:cNvPr id="2" name="Title 1"/>
           <p:cNvSpPr>
             <a:spLocks noGrp="1"/>
           </p:cNvSpPr>
@@ -2028,15 +2148,26 @@
         </p:nvSpPr>
         <p:spPr>
           <a:xfrm>
-            <a:off x="457200" y="273050"/>
-            <a:ext cx="3008313" cy="1162050"/>
+            <a:off x="5907087" y="266700"/>
+            <a:ext cx="3008313" cy="2095500"/>
           </a:xfrm>
         </p:spPr>
         <p:txBody>
           <a:bodyPr anchor="b"/>
           <a:lstStyle>
-            <a:lvl1pPr algn="l">
-              <a:defRPr sz="2000" b="1"/>
+            <a:lvl1pPr algn="ctr">
+              <a:lnSpc>
+                <a:spcPct val="100000"/>
+              </a:lnSpc>
+              <a:defRPr sz="2800" b="0">
+                <a:effectLst>
+                  <a:outerShdw blurRad="50800" dist="25400" dir="5400000" algn="t" rotWithShape="0">
+                    <a:prstClr val="black">
+                      <a:alpha val="25000"/>
+                    </a:prstClr>
+                  </a:outerShdw>
+                </a:effectLst>
+              </a:defRPr>
             </a:lvl1pPr>
           </a:lstStyle>
           <a:p>
@@ -2044,13 +2175,13 @@
               <a:rPr lang="es-ES" smtClean="0"/>
               <a:t>Haga clic para modificar el estilo de título del patrón</a:t>
             </a:r>
-            <a:endParaRPr lang="es-ES"/>
-          </a:p>
-        </p:txBody>
-      </p:sp>
-      <p:sp>
-        <p:nvSpPr>
-          <p:cNvPr id="3" name="2 Marcador de contenido"/>
+            <a:endParaRPr lang="en-US" dirty="0"/>
+          </a:p>
+        </p:txBody>
+      </p:sp>
+      <p:sp>
+        <p:nvSpPr>
+          <p:cNvPr id="3" name="Content Placeholder 2"/>
           <p:cNvSpPr>
             <a:spLocks noGrp="1"/>
           </p:cNvSpPr>
@@ -2060,8 +2191,8 @@
         </p:nvSpPr>
         <p:spPr>
           <a:xfrm>
-            <a:off x="3575050" y="273050"/>
-            <a:ext cx="5111750" cy="5853113"/>
+            <a:off x="719137" y="273050"/>
+            <a:ext cx="4995863" cy="5853113"/>
           </a:xfrm>
         </p:spPr>
         <p:txBody>
@@ -2129,13 +2260,13 @@
               <a:rPr lang="es-ES" smtClean="0"/>
               <a:t>Quinto nivel</a:t>
             </a:r>
-            <a:endParaRPr lang="es-ES"/>
-          </a:p>
-        </p:txBody>
-      </p:sp>
-      <p:sp>
-        <p:nvSpPr>
-          <p:cNvPr id="4" name="3 Marcador de texto"/>
+            <a:endParaRPr lang="en-US" dirty="0"/>
+          </a:p>
+        </p:txBody>
+      </p:sp>
+      <p:sp>
+        <p:nvSpPr>
+          <p:cNvPr id="4" name="Text Placeholder 3"/>
           <p:cNvSpPr>
             <a:spLocks noGrp="1"/>
           </p:cNvSpPr>
@@ -2145,16 +2276,21 @@
         </p:nvSpPr>
         <p:spPr>
           <a:xfrm>
-            <a:off x="457200" y="1435100"/>
-            <a:ext cx="3008313" cy="4691063"/>
+            <a:off x="5907087" y="2438400"/>
+            <a:ext cx="3008313" cy="3687763"/>
           </a:xfrm>
         </p:spPr>
         <p:txBody>
-          <a:bodyPr/>
+          <a:bodyPr>
+            <a:normAutofit/>
+          </a:bodyPr>
           <a:lstStyle>
-            <a:lvl1pPr marL="0" indent="0">
-              <a:buNone/>
-              <a:defRPr sz="1400"/>
+            <a:lvl1pPr marL="0" indent="0" algn="ctr">
+              <a:lnSpc>
+                <a:spcPct val="125000"/>
+              </a:lnSpc>
+              <a:buNone/>
+              <a:defRPr sz="1600"/>
             </a:lvl1pPr>
             <a:lvl2pPr marL="457200" indent="0">
               <a:buNone/>
@@ -2200,7 +2336,7 @@
       </p:sp>
       <p:sp>
         <p:nvSpPr>
-          <p:cNvPr id="5" name="4 Marcador de fecha"/>
+          <p:cNvPr id="5" name="Date Placeholder 4"/>
           <p:cNvSpPr>
             <a:spLocks noGrp="1"/>
           </p:cNvSpPr>
@@ -2215,7 +2351,7 @@
           <a:p>
             <a:fld id="{7A847CFC-816F-41D0-AAC0-9BF4FEBC753E}" type="datetimeFigureOut">
               <a:rPr lang="es-ES" smtClean="0"/>
-              <a:t>16/06/2019</a:t>
+              <a:t>17/06/2019</a:t>
             </a:fld>
             <a:endParaRPr lang="es-ES"/>
           </a:p>
@@ -2223,7 +2359,7 @@
       </p:sp>
       <p:sp>
         <p:nvSpPr>
-          <p:cNvPr id="6" name="5 Marcador de pie de página"/>
+          <p:cNvPr id="6" name="Footer Placeholder 5"/>
           <p:cNvSpPr>
             <a:spLocks noGrp="1"/>
           </p:cNvSpPr>
@@ -2242,7 +2378,7 @@
       </p:sp>
       <p:sp>
         <p:nvSpPr>
-          <p:cNvPr id="7" name="6 Marcador de número de diapositiva"/>
+          <p:cNvPr id="7" name="Slide Number Placeholder 6"/>
           <p:cNvSpPr>
             <a:spLocks noGrp="1"/>
           </p:cNvSpPr>
@@ -2290,7 +2426,7 @@
       </p:grpSpPr>
       <p:sp>
         <p:nvSpPr>
-          <p:cNvPr id="2" name="1 Título"/>
+          <p:cNvPr id="2" name="Title 1"/>
           <p:cNvSpPr>
             <a:spLocks noGrp="1"/>
           </p:cNvSpPr>
@@ -2300,15 +2436,18 @@
         </p:nvSpPr>
         <p:spPr>
           <a:xfrm>
-            <a:off x="1792288" y="4800600"/>
-            <a:ext cx="5486400" cy="566738"/>
+            <a:off x="1679576" y="228600"/>
+            <a:ext cx="5711824" cy="895350"/>
           </a:xfrm>
         </p:spPr>
         <p:txBody>
           <a:bodyPr anchor="b"/>
           <a:lstStyle>
-            <a:lvl1pPr algn="l">
-              <a:defRPr sz="2000" b="1"/>
+            <a:lvl1pPr algn="ctr">
+              <a:lnSpc>
+                <a:spcPct val="100000"/>
+              </a:lnSpc>
+              <a:defRPr sz="2800" b="0"/>
             </a:lvl1pPr>
           </a:lstStyle>
           <a:p>
@@ -2316,13 +2455,13 @@
               <a:rPr lang="es-ES" smtClean="0"/>
               <a:t>Haga clic para modificar el estilo de título del patrón</a:t>
             </a:r>
-            <a:endParaRPr lang="es-ES"/>
-          </a:p>
-        </p:txBody>
-      </p:sp>
-      <p:sp>
-        <p:nvSpPr>
-          <p:cNvPr id="3" name="2 Marcador de posición de imagen"/>
+            <a:endParaRPr lang="en-US" dirty="0"/>
+          </a:p>
+        </p:txBody>
+      </p:sp>
+      <p:sp>
+        <p:nvSpPr>
+          <p:cNvPr id="3" name="Picture Placeholder 2"/>
           <p:cNvSpPr>
             <a:spLocks noGrp="1"/>
           </p:cNvSpPr>
@@ -2332,14 +2471,26 @@
         </p:nvSpPr>
         <p:spPr>
           <a:xfrm>
-            <a:off x="1792288" y="612775"/>
-            <a:ext cx="5486400" cy="4114800"/>
+            <a:off x="1508126" y="1143000"/>
+            <a:ext cx="6054724" cy="4541044"/>
           </a:xfrm>
+          <a:ln w="76200">
+            <a:solidFill>
+              <a:schemeClr val="bg1"/>
+            </a:solidFill>
+          </a:ln>
+          <a:effectLst>
+            <a:outerShdw blurRad="88900" dist="50800" dir="5400000" algn="ctr" rotWithShape="0">
+              <a:srgbClr val="000000">
+                <a:alpha val="25000"/>
+              </a:srgbClr>
+            </a:outerShdw>
+          </a:effectLst>
         </p:spPr>
         <p:txBody>
-          <a:bodyPr/>
+          <a:bodyPr anchor="t"/>
           <a:lstStyle>
-            <a:lvl1pPr marL="0" indent="0">
+            <a:lvl1pPr marL="0" indent="0" algn="ctr">
               <a:buNone/>
               <a:defRPr sz="3200"/>
             </a:lvl1pPr>
@@ -2377,13 +2528,17 @@
             </a:lvl9pPr>
           </a:lstStyle>
           <a:p>
-            <a:endParaRPr lang="es-ES"/>
-          </a:p>
-        </p:txBody>
-      </p:sp>
-      <p:sp>
-        <p:nvSpPr>
-          <p:cNvPr id="4" name="3 Marcador de texto"/>
+            <a:r>
+              <a:rPr lang="es-ES" smtClean="0"/>
+              <a:t>Haga clic en el icono para agregar una imagen</a:t>
+            </a:r>
+            <a:endParaRPr lang="en-US" dirty="0"/>
+          </a:p>
+        </p:txBody>
+      </p:sp>
+      <p:sp>
+        <p:nvSpPr>
+          <p:cNvPr id="4" name="Text Placeholder 3"/>
           <p:cNvSpPr>
             <a:spLocks noGrp="1"/>
           </p:cNvSpPr>
@@ -2393,16 +2548,18 @@
         </p:nvSpPr>
         <p:spPr>
           <a:xfrm>
-            <a:off x="1792288" y="5367338"/>
-            <a:ext cx="5486400" cy="804862"/>
+            <a:off x="1679576" y="5810250"/>
+            <a:ext cx="5711824" cy="533400"/>
           </a:xfrm>
         </p:spPr>
         <p:txBody>
-          <a:bodyPr/>
+          <a:bodyPr>
+            <a:normAutofit/>
+          </a:bodyPr>
           <a:lstStyle>
-            <a:lvl1pPr marL="0" indent="0">
-              <a:buNone/>
-              <a:defRPr sz="1400"/>
+            <a:lvl1pPr marL="0" indent="0" algn="ctr">
+              <a:buNone/>
+              <a:defRPr sz="1600"/>
             </a:lvl1pPr>
             <a:lvl2pPr marL="457200" indent="0">
               <a:buNone/>
@@ -2448,7 +2605,7 @@
       </p:sp>
       <p:sp>
         <p:nvSpPr>
-          <p:cNvPr id="5" name="4 Marcador de fecha"/>
+          <p:cNvPr id="5" name="Date Placeholder 4"/>
           <p:cNvSpPr>
             <a:spLocks noGrp="1"/>
           </p:cNvSpPr>
@@ -2463,7 +2620,7 @@
           <a:p>
             <a:fld id="{7A847CFC-816F-41D0-AAC0-9BF4FEBC753E}" type="datetimeFigureOut">
               <a:rPr lang="es-ES" smtClean="0"/>
-              <a:t>16/06/2019</a:t>
+              <a:t>17/06/2019</a:t>
             </a:fld>
             <a:endParaRPr lang="es-ES"/>
           </a:p>
@@ -2471,7 +2628,7 @@
       </p:sp>
       <p:sp>
         <p:nvSpPr>
-          <p:cNvPr id="6" name="5 Marcador de pie de página"/>
+          <p:cNvPr id="6" name="Footer Placeholder 5"/>
           <p:cNvSpPr>
             <a:spLocks noGrp="1"/>
           </p:cNvSpPr>
@@ -2490,7 +2647,7 @@
       </p:sp>
       <p:sp>
         <p:nvSpPr>
-          <p:cNvPr id="7" name="6 Marcador de número de diapositiva"/>
+          <p:cNvPr id="7" name="Slide Number Placeholder 6"/>
           <p:cNvSpPr>
             <a:spLocks noGrp="1"/>
           </p:cNvSpPr>
@@ -2523,7 +2680,7 @@
 <p:sldMaster xmlns:a="http://schemas.openxmlformats.org/drawingml/2006/main" xmlns:r="http://schemas.openxmlformats.org/officeDocument/2006/relationships" xmlns:p="http://schemas.openxmlformats.org/presentationml/2006/main">
   <p:cSld>
     <p:bg>
-      <p:bgRef idx="1001">
+      <p:bgRef idx="1002">
         <a:schemeClr val="bg1"/>
       </p:bgRef>
     </p:bg>
@@ -2543,7 +2700,7 @@
       </p:grpSpPr>
       <p:sp>
         <p:nvSpPr>
-          <p:cNvPr id="2" name="1 Marcador de título"/>
+          <p:cNvPr id="2" name="Title Placeholder 1"/>
           <p:cNvSpPr>
             <a:spLocks noGrp="1"/>
           </p:cNvSpPr>
@@ -2553,16 +2710,16 @@
         </p:nvSpPr>
         <p:spPr>
           <a:xfrm>
-            <a:off x="457200" y="274638"/>
-            <a:ext cx="8229600" cy="1143000"/>
+            <a:off x="457200" y="0"/>
+            <a:ext cx="8229600" cy="1600200"/>
           </a:xfrm>
           <a:prstGeom prst="rect">
             <a:avLst/>
           </a:prstGeom>
         </p:spPr>
         <p:txBody>
-          <a:bodyPr vert="horz" lIns="91440" tIns="45720" rIns="91440" bIns="45720" rtlCol="0" anchor="ctr">
-            <a:normAutofit/>
+          <a:bodyPr vert="horz" lIns="91440" tIns="45720" rIns="91440" bIns="45720" rtlCol="0" anchor="b">
+            <a:noAutofit/>
           </a:bodyPr>
           <a:lstStyle/>
           <a:p>
@@ -2570,13 +2727,13 @@
               <a:rPr lang="es-ES" smtClean="0"/>
               <a:t>Haga clic para modificar el estilo de título del patrón</a:t>
             </a:r>
-            <a:endParaRPr lang="es-ES"/>
-          </a:p>
-        </p:txBody>
-      </p:sp>
-      <p:sp>
-        <p:nvSpPr>
-          <p:cNvPr id="3" name="2 Marcador de texto"/>
+            <a:endParaRPr lang="en-US" dirty="0"/>
+          </a:p>
+        </p:txBody>
+      </p:sp>
+      <p:sp>
+        <p:nvSpPr>
+          <p:cNvPr id="3" name="Text Placeholder 2"/>
           <p:cNvSpPr>
             <a:spLocks noGrp="1"/>
           </p:cNvSpPr>
@@ -2632,13 +2789,13 @@
               <a:rPr lang="es-ES" smtClean="0"/>
               <a:t>Quinto nivel</a:t>
             </a:r>
-            <a:endParaRPr lang="es-ES"/>
-          </a:p>
-        </p:txBody>
-      </p:sp>
-      <p:sp>
-        <p:nvSpPr>
-          <p:cNvPr id="4" name="3 Marcador de fecha"/>
+            <a:endParaRPr lang="en-US" dirty="0" smtClean="0"/>
+          </a:p>
+        </p:txBody>
+      </p:sp>
+      <p:sp>
+        <p:nvSpPr>
+          <p:cNvPr id="4" name="Date Placeholder 3"/>
           <p:cNvSpPr>
             <a:spLocks noGrp="1"/>
           </p:cNvSpPr>
@@ -2648,110 +2805,223 @@
         </p:nvSpPr>
         <p:spPr>
           <a:xfrm>
-            <a:off x="457200" y="6356350"/>
-            <a:ext cx="2133600" cy="365125"/>
+            <a:off x="6363347" y="6356350"/>
+            <a:ext cx="2085975" cy="365125"/>
           </a:xfrm>
           <a:prstGeom prst="rect">
             <a:avLst/>
           </a:prstGeom>
         </p:spPr>
         <p:txBody>
-          <a:bodyPr vert="horz" lIns="91440" tIns="45720" rIns="91440" bIns="45720" rtlCol="0" anchor="ctr"/>
+          <a:bodyPr vert="horz" lIns="91440" tIns="45720" rIns="45720" bIns="45720" rtlCol="0" anchor="ctr"/>
+          <a:lstStyle>
+            <a:lvl1pPr algn="r">
+              <a:defRPr sz="1200">
+                <a:solidFill>
+                  <a:schemeClr val="tx1">
+                    <a:lumMod val="65000"/>
+                    <a:lumOff val="35000"/>
+                  </a:schemeClr>
+                </a:solidFill>
+                <a:latin typeface="Century Gothic" pitchFamily="34" charset="0"/>
+              </a:defRPr>
+            </a:lvl1pPr>
+          </a:lstStyle>
+          <a:p>
+            <a:fld id="{7A847CFC-816F-41D0-AAC0-9BF4FEBC753E}" type="datetimeFigureOut">
+              <a:rPr lang="es-ES" smtClean="0"/>
+              <a:t>17/06/2019</a:t>
+            </a:fld>
+            <a:endParaRPr lang="es-ES"/>
+          </a:p>
+        </p:txBody>
+      </p:sp>
+      <p:sp>
+        <p:nvSpPr>
+          <p:cNvPr id="5" name="Footer Placeholder 4"/>
+          <p:cNvSpPr>
+            <a:spLocks noGrp="1"/>
+          </p:cNvSpPr>
+          <p:nvPr>
+            <p:ph type="ftr" sz="quarter" idx="3"/>
+          </p:nvPr>
+        </p:nvSpPr>
+        <p:spPr>
+          <a:xfrm>
+            <a:off x="659165" y="6356350"/>
+            <a:ext cx="2847975" cy="365125"/>
+          </a:xfrm>
+          <a:prstGeom prst="rect">
+            <a:avLst/>
+          </a:prstGeom>
+        </p:spPr>
+        <p:txBody>
+          <a:bodyPr vert="horz" lIns="45720" tIns="45720" rIns="91440" bIns="45720" rtlCol="0" anchor="ctr"/>
           <a:lstStyle>
             <a:lvl1pPr algn="l">
               <a:defRPr sz="1200">
                 <a:solidFill>
                   <a:schemeClr val="tx1">
-                    <a:tint val="75000"/>
+                    <a:lumMod val="65000"/>
+                    <a:lumOff val="35000"/>
                   </a:schemeClr>
                 </a:solidFill>
+                <a:latin typeface="Century Gothic" pitchFamily="34" charset="0"/>
               </a:defRPr>
             </a:lvl1pPr>
           </a:lstStyle>
           <a:p>
-            <a:fld id="{7A847CFC-816F-41D0-AAC0-9BF4FEBC753E}" type="datetimeFigureOut">
-              <a:rPr lang="es-ES" smtClean="0"/>
-              <a:t>16/06/2019</a:t>
-            </a:fld>
             <a:endParaRPr lang="es-ES"/>
           </a:p>
         </p:txBody>
       </p:sp>
       <p:sp>
         <p:nvSpPr>
-          <p:cNvPr id="5" name="4 Marcador de pie de página"/>
-          <p:cNvSpPr>
-            <a:spLocks noGrp="1"/>
-          </p:cNvSpPr>
-          <p:nvPr>
-            <p:ph type="ftr" sz="quarter" idx="3"/>
+          <p:cNvPr id="6" name="Slide Number Placeholder 5"/>
+          <p:cNvSpPr>
+            <a:spLocks noGrp="1"/>
+          </p:cNvSpPr>
+          <p:nvPr>
+            <p:ph type="sldNum" sz="quarter" idx="4"/>
           </p:nvPr>
         </p:nvSpPr>
         <p:spPr>
           <a:xfrm>
-            <a:off x="3124200" y="6356350"/>
-            <a:ext cx="2895600" cy="365125"/>
+            <a:off x="8543278" y="6356350"/>
+            <a:ext cx="561975" cy="365125"/>
           </a:xfrm>
           <a:prstGeom prst="rect">
             <a:avLst/>
           </a:prstGeom>
         </p:spPr>
         <p:txBody>
-          <a:bodyPr vert="horz" lIns="91440" tIns="45720" rIns="91440" bIns="45720" rtlCol="0" anchor="ctr"/>
+          <a:bodyPr vert="horz" lIns="27432" tIns="45720" rIns="45720" bIns="45720" rtlCol="0" anchor="ctr"/>
           <a:lstStyle>
-            <a:lvl1pPr algn="ctr">
+            <a:lvl1pPr algn="l">
               <a:defRPr sz="1200">
                 <a:solidFill>
                   <a:schemeClr val="tx1">
-                    <a:tint val="75000"/>
+                    <a:lumMod val="65000"/>
+                    <a:lumOff val="35000"/>
                   </a:schemeClr>
                 </a:solidFill>
+                <a:latin typeface="Century Gothic" pitchFamily="34" charset="0"/>
               </a:defRPr>
             </a:lvl1pPr>
           </a:lstStyle>
           <a:p>
-            <a:endParaRPr lang="es-ES"/>
-          </a:p>
-        </p:txBody>
-      </p:sp>
-      <p:sp>
-        <p:nvSpPr>
-          <p:cNvPr id="6" name="5 Marcador de número de diapositiva"/>
-          <p:cNvSpPr>
-            <a:spLocks noGrp="1"/>
-          </p:cNvSpPr>
-          <p:nvPr>
-            <p:ph type="sldNum" sz="quarter" idx="4"/>
-          </p:nvPr>
-        </p:nvSpPr>
-        <p:spPr>
-          <a:xfrm>
-            <a:off x="6553200" y="6356350"/>
-            <a:ext cx="2133600" cy="365125"/>
-          </a:xfrm>
-          <a:prstGeom prst="rect">
-            <a:avLst/>
-          </a:prstGeom>
-        </p:spPr>
-        <p:txBody>
-          <a:bodyPr vert="horz" lIns="91440" tIns="45720" rIns="91440" bIns="45720" rtlCol="0" anchor="ctr"/>
-          <a:lstStyle>
-            <a:lvl1pPr algn="r">
-              <a:defRPr sz="1200">
-                <a:solidFill>
-                  <a:schemeClr val="tx1">
-                    <a:tint val="75000"/>
-                  </a:schemeClr>
-                </a:solidFill>
-              </a:defRPr>
-            </a:lvl1pPr>
-          </a:lstStyle>
-          <a:p>
             <a:fld id="{132FADFE-3B8F-471C-ABF0-DBC7717ECBBC}" type="slidenum">
               <a:rPr lang="es-ES" smtClean="0"/>
               <a:t>‹Nº›</a:t>
             </a:fld>
             <a:endParaRPr lang="es-ES"/>
+          </a:p>
+        </p:txBody>
+      </p:sp>
+      <p:sp>
+        <p:nvSpPr>
+          <p:cNvPr id="7" name="Oval 6"/>
+          <p:cNvSpPr/>
+          <p:nvPr/>
+        </p:nvSpPr>
+        <p:spPr>
+          <a:xfrm>
+            <a:off x="8457760" y="6499384"/>
+            <a:ext cx="84772" cy="84772"/>
+          </a:xfrm>
+          <a:prstGeom prst="ellipse">
+            <a:avLst/>
+          </a:prstGeom>
+          <a:solidFill>
+            <a:schemeClr val="tx1">
+              <a:lumMod val="50000"/>
+              <a:lumOff val="50000"/>
+            </a:schemeClr>
+          </a:solidFill>
+          <a:ln w="12700">
+            <a:noFill/>
+          </a:ln>
+          <a:effectLst/>
+        </p:spPr>
+        <p:style>
+          <a:lnRef idx="2">
+            <a:schemeClr val="accent1">
+              <a:shade val="50000"/>
+            </a:schemeClr>
+          </a:lnRef>
+          <a:fillRef idx="1">
+            <a:schemeClr val="accent1"/>
+          </a:fillRef>
+          <a:effectRef idx="0">
+            <a:schemeClr val="accent1"/>
+          </a:effectRef>
+          <a:fontRef idx="minor">
+            <a:schemeClr val="lt1"/>
+          </a:fontRef>
+        </p:style>
+        <p:txBody>
+          <a:bodyPr rtlCol="0" anchor="ctr"/>
+          <a:lstStyle/>
+          <a:p>
+            <a:pPr marL="0" algn="ctr" defTabSz="914400" rtl="0" eaLnBrk="1" latinLnBrk="0" hangingPunct="1"/>
+            <a:endParaRPr lang="en-US" sz="1800" kern="1200">
+              <a:solidFill>
+                <a:schemeClr val="lt1"/>
+              </a:solidFill>
+              <a:latin typeface="+mn-lt"/>
+              <a:ea typeface="+mn-ea"/>
+              <a:cs typeface="+mn-cs"/>
+            </a:endParaRPr>
+          </a:p>
+        </p:txBody>
+      </p:sp>
+      <p:sp>
+        <p:nvSpPr>
+          <p:cNvPr id="8" name="Oval 7"/>
+          <p:cNvSpPr/>
+          <p:nvPr/>
+        </p:nvSpPr>
+        <p:spPr>
+          <a:xfrm>
+            <a:off x="569119" y="6499384"/>
+            <a:ext cx="84772" cy="84772"/>
+          </a:xfrm>
+          <a:prstGeom prst="ellipse">
+            <a:avLst/>
+          </a:prstGeom>
+          <a:solidFill>
+            <a:schemeClr val="tx1">
+              <a:lumMod val="50000"/>
+              <a:lumOff val="50000"/>
+            </a:schemeClr>
+          </a:solidFill>
+          <a:ln w="12700">
+            <a:noFill/>
+          </a:ln>
+          <a:effectLst/>
+        </p:spPr>
+        <p:style>
+          <a:lnRef idx="2">
+            <a:schemeClr val="accent1">
+              <a:shade val="50000"/>
+            </a:schemeClr>
+          </a:lnRef>
+          <a:fillRef idx="1">
+            <a:schemeClr val="accent1"/>
+          </a:fillRef>
+          <a:effectRef idx="0">
+            <a:schemeClr val="accent1"/>
+          </a:effectRef>
+          <a:fontRef idx="minor">
+            <a:schemeClr val="lt1"/>
+          </a:fontRef>
+        </p:style>
+        <p:txBody>
+          <a:bodyPr rtlCol="0" anchor="ctr"/>
+          <a:lstStyle/>
+          <a:p>
+            <a:pPr algn="ctr"/>
+            <a:endParaRPr lang="en-US"/>
           </a:p>
         </p:txBody>
       </p:sp>
@@ -2759,30 +3029,40 @@
   </p:cSld>
   <p:clrMap bg1="lt1" tx1="dk1" bg2="lt2" tx2="dk2" accent1="accent1" accent2="accent2" accent3="accent3" accent4="accent4" accent5="accent5" accent6="accent6" hlink="hlink" folHlink="folHlink"/>
   <p:sldLayoutIdLst>
-    <p:sldLayoutId id="2147483649" r:id="rId1"/>
-    <p:sldLayoutId id="2147483650" r:id="rId2"/>
-    <p:sldLayoutId id="2147483651" r:id="rId3"/>
-    <p:sldLayoutId id="2147483652" r:id="rId4"/>
-    <p:sldLayoutId id="2147483653" r:id="rId5"/>
-    <p:sldLayoutId id="2147483654" r:id="rId6"/>
-    <p:sldLayoutId id="2147483655" r:id="rId7"/>
-    <p:sldLayoutId id="2147483656" r:id="rId8"/>
-    <p:sldLayoutId id="2147483657" r:id="rId9"/>
-    <p:sldLayoutId id="2147483658" r:id="rId10"/>
-    <p:sldLayoutId id="2147483659" r:id="rId11"/>
+    <p:sldLayoutId id="2147483769" r:id="rId1"/>
+    <p:sldLayoutId id="2147483770" r:id="rId2"/>
+    <p:sldLayoutId id="2147483771" r:id="rId3"/>
+    <p:sldLayoutId id="2147483772" r:id="rId4"/>
+    <p:sldLayoutId id="2147483773" r:id="rId5"/>
+    <p:sldLayoutId id="2147483774" r:id="rId6"/>
+    <p:sldLayoutId id="2147483775" r:id="rId7"/>
+    <p:sldLayoutId id="2147483776" r:id="rId8"/>
+    <p:sldLayoutId id="2147483777" r:id="rId9"/>
+    <p:sldLayoutId id="2147483778" r:id="rId10"/>
+    <p:sldLayoutId id="2147483779" r:id="rId11"/>
   </p:sldLayoutIdLst>
   <p:txStyles>
     <p:titleStyle>
       <a:lvl1pPr algn="ctr" defTabSz="914400" rtl="0" eaLnBrk="1" latinLnBrk="0" hangingPunct="1">
+        <a:lnSpc>
+          <a:spcPts val="5800"/>
+        </a:lnSpc>
         <a:spcBef>
           <a:spcPct val="0"/>
         </a:spcBef>
         <a:buNone/>
-        <a:defRPr sz="4400" kern="1200">
+        <a:defRPr sz="5400" kern="1200">
           <a:solidFill>
-            <a:schemeClr val="tx1"/>
+            <a:schemeClr val="tx2"/>
           </a:solidFill>
-          <a:latin typeface="+mj-lt"/>
+          <a:effectLst>
+            <a:outerShdw blurRad="63500" dist="38100" dir="5400000" algn="t" rotWithShape="0">
+              <a:prstClr val="black">
+                <a:alpha val="25000"/>
+              </a:prstClr>
+            </a:outerShdw>
+          </a:effectLst>
+          <a:latin typeface="+mn-lt"/>
           <a:ea typeface="+mj-ea"/>
           <a:cs typeface="+mj-cs"/>
         </a:defRPr>
@@ -2795,11 +3075,14 @@
         </a:spcBef>
         <a:buFont typeface="Arial" pitchFamily="34" charset="0"/>
         <a:buChar char="•"/>
-        <a:defRPr sz="3200" kern="1200">
+        <a:defRPr sz="2400" kern="1200">
           <a:solidFill>
-            <a:schemeClr val="tx1"/>
+            <a:schemeClr val="tx1">
+              <a:lumMod val="50000"/>
+              <a:lumOff val="50000"/>
+            </a:schemeClr>
           </a:solidFill>
-          <a:latin typeface="+mn-lt"/>
+          <a:latin typeface="+mj-lt"/>
           <a:ea typeface="+mn-ea"/>
           <a:cs typeface="+mn-cs"/>
         </a:defRPr>
@@ -2808,13 +3091,16 @@
         <a:spcBef>
           <a:spcPct val="20000"/>
         </a:spcBef>
-        <a:buFont typeface="Arial" pitchFamily="34" charset="0"/>
-        <a:buChar char="–"/>
-        <a:defRPr sz="2800" kern="1200">
+        <a:buFont typeface="Courier New" pitchFamily="49" charset="0"/>
+        <a:buChar char="o"/>
+        <a:defRPr sz="1600" kern="1200">
           <a:solidFill>
-            <a:schemeClr val="tx1"/>
+            <a:schemeClr val="tx1">
+              <a:lumMod val="50000"/>
+              <a:lumOff val="50000"/>
+            </a:schemeClr>
           </a:solidFill>
-          <a:latin typeface="+mn-lt"/>
+          <a:latin typeface="+mj-lt"/>
           <a:ea typeface="+mn-ea"/>
           <a:cs typeface="+mn-cs"/>
         </a:defRPr>
@@ -2825,11 +3111,14 @@
         </a:spcBef>
         <a:buFont typeface="Arial" pitchFamily="34" charset="0"/>
         <a:buChar char="•"/>
-        <a:defRPr sz="2400" kern="1200">
+        <a:defRPr sz="1600" kern="1200">
           <a:solidFill>
-            <a:schemeClr val="tx1"/>
+            <a:schemeClr val="tx1">
+              <a:lumMod val="50000"/>
+              <a:lumOff val="50000"/>
+            </a:schemeClr>
           </a:solidFill>
-          <a:latin typeface="+mn-lt"/>
+          <a:latin typeface="+mj-lt"/>
           <a:ea typeface="+mn-ea"/>
           <a:cs typeface="+mn-cs"/>
         </a:defRPr>
@@ -2838,13 +3127,16 @@
         <a:spcBef>
           <a:spcPct val="20000"/>
         </a:spcBef>
-        <a:buFont typeface="Arial" pitchFamily="34" charset="0"/>
-        <a:buChar char="–"/>
-        <a:defRPr sz="2000" kern="1200">
+        <a:buFont typeface="Courier New" pitchFamily="49" charset="0"/>
+        <a:buChar char="o"/>
+        <a:defRPr sz="1600" kern="1200">
           <a:solidFill>
-            <a:schemeClr val="tx1"/>
+            <a:schemeClr val="tx1">
+              <a:lumMod val="50000"/>
+              <a:lumOff val="50000"/>
+            </a:schemeClr>
           </a:solidFill>
-          <a:latin typeface="+mn-lt"/>
+          <a:latin typeface="+mj-lt"/>
           <a:ea typeface="+mn-ea"/>
           <a:cs typeface="+mn-cs"/>
         </a:defRPr>
@@ -2854,12 +3146,15 @@
           <a:spcPct val="20000"/>
         </a:spcBef>
         <a:buFont typeface="Arial" pitchFamily="34" charset="0"/>
-        <a:buChar char="»"/>
-        <a:defRPr sz="2000" kern="1200">
+        <a:buChar char="•"/>
+        <a:defRPr sz="1600" kern="1200">
           <a:solidFill>
-            <a:schemeClr val="tx1"/>
+            <a:schemeClr val="tx1">
+              <a:lumMod val="50000"/>
+              <a:lumOff val="50000"/>
+            </a:schemeClr>
           </a:solidFill>
-          <a:latin typeface="+mn-lt"/>
+          <a:latin typeface="+mj-lt"/>
           <a:ea typeface="+mn-ea"/>
           <a:cs typeface="+mn-cs"/>
         </a:defRPr>
@@ -2868,13 +3163,16 @@
         <a:spcBef>
           <a:spcPct val="20000"/>
         </a:spcBef>
-        <a:buFont typeface="Arial" pitchFamily="34" charset="0"/>
-        <a:buChar char="•"/>
-        <a:defRPr sz="2000" kern="1200">
+        <a:buFont typeface="Courier New" pitchFamily="49" charset="0"/>
+        <a:buChar char="o"/>
+        <a:defRPr sz="1600" kern="1200">
           <a:solidFill>
-            <a:schemeClr val="tx1"/>
+            <a:schemeClr val="tx1">
+              <a:lumMod val="50000"/>
+              <a:lumOff val="50000"/>
+            </a:schemeClr>
           </a:solidFill>
-          <a:latin typeface="+mn-lt"/>
+          <a:latin typeface="+mj-lt"/>
           <a:ea typeface="+mn-ea"/>
           <a:cs typeface="+mn-cs"/>
         </a:defRPr>
@@ -2885,11 +3183,14 @@
         </a:spcBef>
         <a:buFont typeface="Arial" pitchFamily="34" charset="0"/>
         <a:buChar char="•"/>
-        <a:defRPr sz="2000" kern="1200">
+        <a:defRPr sz="1600" kern="1200">
           <a:solidFill>
-            <a:schemeClr val="tx1"/>
+            <a:schemeClr val="tx1">
+              <a:lumMod val="50000"/>
+              <a:lumOff val="50000"/>
+            </a:schemeClr>
           </a:solidFill>
-          <a:latin typeface="+mn-lt"/>
+          <a:latin typeface="+mj-lt"/>
           <a:ea typeface="+mn-ea"/>
           <a:cs typeface="+mn-cs"/>
         </a:defRPr>
@@ -2898,13 +3199,16 @@
         <a:spcBef>
           <a:spcPct val="20000"/>
         </a:spcBef>
-        <a:buFont typeface="Arial" pitchFamily="34" charset="0"/>
-        <a:buChar char="•"/>
-        <a:defRPr sz="2000" kern="1200">
+        <a:buFont typeface="Courier New" pitchFamily="49" charset="0"/>
+        <a:buChar char="o"/>
+        <a:defRPr sz="1600" kern="1200">
           <a:solidFill>
-            <a:schemeClr val="tx1"/>
+            <a:schemeClr val="tx1">
+              <a:lumMod val="50000"/>
+              <a:lumOff val="50000"/>
+            </a:schemeClr>
           </a:solidFill>
-          <a:latin typeface="+mn-lt"/>
+          <a:latin typeface="+mj-lt"/>
           <a:ea typeface="+mn-ea"/>
           <a:cs typeface="+mn-cs"/>
         </a:defRPr>
@@ -2915,11 +3219,14 @@
         </a:spcBef>
         <a:buFont typeface="Arial" pitchFamily="34" charset="0"/>
         <a:buChar char="•"/>
-        <a:defRPr sz="2000" kern="1200">
+        <a:defRPr sz="1600" kern="1200">
           <a:solidFill>
-            <a:schemeClr val="tx1"/>
+            <a:schemeClr val="tx1">
+              <a:lumMod val="50000"/>
+              <a:lumOff val="50000"/>
+            </a:schemeClr>
           </a:solidFill>
-          <a:latin typeface="+mn-lt"/>
+          <a:latin typeface="+mj-lt"/>
           <a:ea typeface="+mn-ea"/>
           <a:cs typeface="+mn-cs"/>
         </a:defRPr>
@@ -2927,7 +3234,7 @@
     </p:bodyStyle>
     <p:otherStyle>
       <a:defPPr>
-        <a:defRPr lang="es-ES"/>
+        <a:defRPr lang="en-US"/>
       </a:defPPr>
       <a:lvl1pPr marL="0" algn="l" defTabSz="914400" rtl="0" eaLnBrk="1" latinLnBrk="0" hangingPunct="1">
         <a:defRPr sz="1800" kern="1200">
@@ -3051,36 +3358,43 @@
             <p:ph type="ctrTitle"/>
           </p:nvPr>
         </p:nvSpPr>
-        <p:spPr/>
-        <p:txBody>
-          <a:bodyPr/>
-          <a:lstStyle/>
-          <a:p>
-            <a:r>
-              <a:rPr lang="en-US" dirty="0" err="1" smtClean="0"/>
+        <p:spPr>
+          <a:xfrm>
+            <a:off x="755576" y="980728"/>
+            <a:ext cx="7772400" cy="2467000"/>
+          </a:xfrm>
+        </p:spPr>
+        <p:txBody>
+          <a:bodyPr>
+            <a:normAutofit/>
+          </a:bodyPr>
+          <a:lstStyle/>
+          <a:p>
+            <a:r>
+              <a:rPr lang="en-US" sz="5400" dirty="0" err="1" smtClean="0"/>
               <a:t>Controlar</a:t>
             </a:r>
             <a:r>
-              <a:rPr lang="en-US" dirty="0" smtClean="0"/>
+              <a:rPr lang="en-US" sz="5400" dirty="0" smtClean="0"/>
               <a:t> la </a:t>
             </a:r>
             <a:r>
-              <a:rPr lang="en-US" dirty="0" err="1" smtClean="0"/>
+              <a:rPr lang="en-US" sz="5400" dirty="0" err="1" smtClean="0"/>
               <a:t>velocidad</a:t>
             </a:r>
             <a:r>
-              <a:rPr lang="en-US" dirty="0" smtClean="0"/>
+              <a:rPr lang="en-US" sz="5400" dirty="0" smtClean="0"/>
               <a:t> de un </a:t>
             </a:r>
             <a:r>
-              <a:rPr lang="en-US" dirty="0" err="1" smtClean="0"/>
+              <a:rPr lang="en-US" sz="5400" dirty="0" err="1" smtClean="0"/>
               <a:t>ventilador</a:t>
             </a:r>
             <a:r>
-              <a:rPr lang="en-US" dirty="0" smtClean="0"/>
+              <a:rPr lang="en-US" sz="5400" dirty="0" smtClean="0"/>
               <a:t> (cooler)</a:t>
             </a:r>
-            <a:endParaRPr lang="es-PY" dirty="0"/>
+            <a:endParaRPr lang="es-PY" sz="5400" dirty="0"/>
           </a:p>
         </p:txBody>
       </p:sp>
@@ -3094,56 +3408,61 @@
             <p:ph type="subTitle" idx="1"/>
           </p:nvPr>
         </p:nvSpPr>
-        <p:spPr/>
+        <p:spPr>
+          <a:xfrm>
+            <a:off x="1403648" y="4005064"/>
+            <a:ext cx="6400800" cy="1219200"/>
+          </a:xfrm>
+        </p:spPr>
         <p:txBody>
           <a:bodyPr>
-            <a:normAutofit fontScale="85000" lnSpcReduction="20000"/>
+            <a:noAutofit/>
           </a:bodyPr>
           <a:lstStyle/>
           <a:p>
             <a:r>
-              <a:rPr lang="en-US" dirty="0" smtClean="0"/>
+              <a:rPr lang="en-US" sz="2000" dirty="0" smtClean="0"/>
               <a:t>Laura Patricia Duarte Espinoza</a:t>
             </a:r>
           </a:p>
           <a:p>
             <a:r>
-              <a:rPr lang="en-US" dirty="0" err="1" smtClean="0"/>
+              <a:rPr lang="en-US" sz="2000" dirty="0" err="1" smtClean="0"/>
               <a:t>Nelba</a:t>
             </a:r>
             <a:r>
-              <a:rPr lang="en-US" dirty="0" smtClean="0"/>
+              <a:rPr lang="en-US" sz="2000" dirty="0" smtClean="0"/>
               <a:t> Alejandra </a:t>
             </a:r>
             <a:r>
-              <a:rPr lang="en-US" dirty="0" err="1" smtClean="0"/>
+              <a:rPr lang="en-US" sz="2000" dirty="0" err="1" smtClean="0"/>
               <a:t>Barreto</a:t>
             </a:r>
             <a:r>
-              <a:rPr lang="en-US" dirty="0" smtClean="0"/>
+              <a:rPr lang="en-US" sz="2000" dirty="0" smtClean="0"/>
               <a:t> Mendez</a:t>
             </a:r>
           </a:p>
           <a:p>
             <a:r>
-              <a:rPr lang="en-US" dirty="0" smtClean="0"/>
+              <a:rPr lang="en-US" sz="2000" dirty="0" smtClean="0"/>
               <a:t>Marcelo Maximiliano </a:t>
             </a:r>
             <a:r>
-              <a:rPr lang="en-US" dirty="0" err="1" smtClean="0"/>
+              <a:rPr lang="en-US" sz="2000" dirty="0" err="1" smtClean="0"/>
               <a:t>Cantero</a:t>
             </a:r>
             <a:r>
-              <a:rPr lang="en-US" dirty="0" smtClean="0"/>
+              <a:rPr lang="en-US" sz="2000" dirty="0" smtClean="0"/>
               <a:t> Vega</a:t>
             </a:r>
           </a:p>
           <a:p>
             <a:r>
-              <a:rPr lang="en-US" dirty="0" smtClean="0"/>
+              <a:rPr lang="en-US" sz="2000" dirty="0" smtClean="0"/>
               <a:t>Guillermo David Miranda Nardelli</a:t>
             </a:r>
-            <a:endParaRPr lang="es-PY" dirty="0"/>
+            <a:endParaRPr lang="es-PY" sz="2000" dirty="0"/>
           </a:p>
         </p:txBody>
       </p:sp>
@@ -3157,6 +3476,13 @@
   <p:clrMapOvr>
     <a:masterClrMapping/>
   </p:clrMapOvr>
+  <p:timing>
+    <p:tnLst>
+      <p:par>
+        <p:cTn id="1" dur="indefinite" restart="never" nodeType="tmRoot"/>
+      </p:par>
+    </p:tnLst>
+  </p:timing>
 </p:sld>
 </file>
 
@@ -3237,6 +3563,13 @@
   <p:clrMapOvr>
     <a:masterClrMapping/>
   </p:clrMapOvr>
+  <p:timing>
+    <p:tnLst>
+      <p:par>
+        <p:cTn id="1" dur="indefinite" restart="never" nodeType="tmRoot"/>
+      </p:par>
+    </p:tnLst>
+  </p:timing>
 </p:sld>
 </file>
 
@@ -3282,25 +3615,48 @@
           </a:p>
         </p:txBody>
       </p:sp>
-      <p:sp>
-        <p:nvSpPr>
-          <p:cNvPr id="3" name="2 Marcador de contenido"/>
-          <p:cNvSpPr>
-            <a:spLocks noGrp="1"/>
-          </p:cNvSpPr>
+      <p:pic>
+        <p:nvPicPr>
+          <p:cNvPr id="3074" name="Picture 2" descr="Image result for pulse width modulation"/>
+          <p:cNvPicPr>
+            <a:picLocks noGrp="1" noChangeAspect="1" noChangeArrowheads="1"/>
+          </p:cNvPicPr>
           <p:nvPr>
             <p:ph idx="1"/>
           </p:nvPr>
-        </p:nvSpPr>
-        <p:spPr/>
-        <p:txBody>
-          <a:bodyPr/>
-          <a:lstStyle/>
-          <a:p>
-            <a:endParaRPr lang="es-PY" dirty="0"/>
-          </a:p>
-        </p:txBody>
-      </p:sp>
+        </p:nvPicPr>
+        <p:blipFill>
+          <a:blip r:embed="rId2">
+            <a:extLst>
+              <a:ext uri="{28A0092B-C50C-407E-A947-70E740481C1C}">
+                <a14:useLocalDpi xmlns:a14="http://schemas.microsoft.com/office/drawing/2010/main" val="0"/>
+              </a:ext>
+            </a:extLst>
+          </a:blip>
+          <a:stretch>
+            <a:fillRect/>
+          </a:stretch>
+        </p:blipFill>
+        <p:spPr bwMode="auto">
+          <a:xfrm>
+            <a:off x="1476375" y="1739106"/>
+            <a:ext cx="6191250" cy="4248150"/>
+          </a:xfrm>
+          <a:prstGeom prst="rect">
+            <a:avLst/>
+          </a:prstGeom>
+          <a:noFill/>
+          <a:extLst>
+            <a:ext uri="{909E8E84-426E-40DD-AFC4-6F175D3DCCD1}">
+              <a14:hiddenFill xmlns:a14="http://schemas.microsoft.com/office/drawing/2010/main">
+                <a:solidFill>
+                  <a:srgbClr val="FFFFFF"/>
+                </a:solidFill>
+              </a14:hiddenFill>
+            </a:ext>
+          </a:extLst>
+        </p:spPr>
+      </p:pic>
     </p:spTree>
     <p:extLst>
       <p:ext uri="{BB962C8B-B14F-4D97-AF65-F5344CB8AC3E}">
@@ -3354,25 +3710,90 @@
           </a:p>
         </p:txBody>
       </p:sp>
-      <p:sp>
-        <p:nvSpPr>
-          <p:cNvPr id="3" name="2 Marcador de contenido"/>
-          <p:cNvSpPr>
-            <a:spLocks noGrp="1"/>
-          </p:cNvSpPr>
+      <p:pic>
+        <p:nvPicPr>
+          <p:cNvPr id="2052" name="Picture 4" descr="Image result for raspberry pi"/>
+          <p:cNvPicPr>
+            <a:picLocks noGrp="1" noChangeAspect="1" noChangeArrowheads="1"/>
+          </p:cNvPicPr>
           <p:nvPr>
             <p:ph idx="1"/>
           </p:nvPr>
-        </p:nvSpPr>
-        <p:spPr/>
-        <p:txBody>
-          <a:bodyPr/>
-          <a:lstStyle/>
-          <a:p>
-            <a:endParaRPr lang="es-PY"/>
-          </a:p>
-        </p:txBody>
-      </p:sp>
+        </p:nvPicPr>
+        <p:blipFill>
+          <a:blip r:embed="rId2">
+            <a:extLst>
+              <a:ext uri="{28A0092B-C50C-407E-A947-70E740481C1C}">
+                <a14:useLocalDpi xmlns:a14="http://schemas.microsoft.com/office/drawing/2010/main" val="0"/>
+              </a:ext>
+            </a:extLst>
+          </a:blip>
+          <a:srcRect/>
+          <a:stretch>
+            <a:fillRect/>
+          </a:stretch>
+        </p:blipFill>
+        <p:spPr bwMode="auto">
+          <a:xfrm>
+            <a:off x="2413850" y="1412776"/>
+            <a:ext cx="4525963" cy="4525963"/>
+          </a:xfrm>
+          <a:prstGeom prst="rect">
+            <a:avLst/>
+          </a:prstGeom>
+          <a:noFill/>
+          <a:extLst>
+            <a:ext uri="{909E8E84-426E-40DD-AFC4-6F175D3DCCD1}">
+              <a14:hiddenFill xmlns:a14="http://schemas.microsoft.com/office/drawing/2010/main">
+                <a:solidFill>
+                  <a:srgbClr val="FFFFFF"/>
+                </a:solidFill>
+              </a14:hiddenFill>
+            </a:ext>
+          </a:extLst>
+        </p:spPr>
+      </p:pic>
+      <p:pic>
+        <p:nvPicPr>
+          <p:cNvPr id="2054" name="Picture 6" descr="Image result for raspberry pi logo"/>
+          <p:cNvPicPr>
+            <a:picLocks noChangeAspect="1" noChangeArrowheads="1"/>
+          </p:cNvPicPr>
+          <p:nvPr/>
+        </p:nvPicPr>
+        <p:blipFill>
+          <a:blip r:embed="rId3" cstate="print">
+            <a:extLst>
+              <a:ext uri="{28A0092B-C50C-407E-A947-70E740481C1C}">
+                <a14:useLocalDpi xmlns:a14="http://schemas.microsoft.com/office/drawing/2010/main" val="0"/>
+              </a:ext>
+            </a:extLst>
+          </a:blip>
+          <a:srcRect/>
+          <a:stretch>
+            <a:fillRect/>
+          </a:stretch>
+        </p:blipFill>
+        <p:spPr bwMode="auto">
+          <a:xfrm>
+            <a:off x="6948264" y="4691293"/>
+            <a:ext cx="1699065" cy="1512168"/>
+          </a:xfrm>
+          <a:prstGeom prst="rect">
+            <a:avLst/>
+          </a:prstGeom>
+          <a:noFill/>
+          <a:extLst>
+            <a:ext uri="{909E8E84-426E-40DD-AFC4-6F175D3DCCD1}">
+              <a14:hiddenFill xmlns:a14="http://schemas.microsoft.com/office/drawing/2010/main">
+                <a:solidFill>
+                  <a:srgbClr val="FFFFFF"/>
+                </a:solidFill>
+              </a14:hiddenFill>
+            </a:ext>
+          </a:extLst>
+        </p:spPr>
+      </p:pic>
     </p:spTree>
     <p:extLst>
       <p:ext uri="{BB962C8B-B14F-4D97-AF65-F5344CB8AC3E}">
@@ -3426,25 +3847,46 @@
           </a:p>
         </p:txBody>
       </p:sp>
-      <p:sp>
-        <p:nvSpPr>
-          <p:cNvPr id="3" name="2 Marcador de contenido"/>
-          <p:cNvSpPr>
-            <a:spLocks noGrp="1"/>
-          </p:cNvSpPr>
+      <p:pic>
+        <p:nvPicPr>
+          <p:cNvPr id="1026" name="Picture 2" descr="Image result for gpio"/>
+          <p:cNvPicPr>
+            <a:picLocks noGrp="1" noChangeAspect="1" noChangeArrowheads="1"/>
+          </p:cNvPicPr>
           <p:nvPr>
             <p:ph idx="1"/>
           </p:nvPr>
-        </p:nvSpPr>
-        <p:spPr/>
-        <p:txBody>
-          <a:bodyPr/>
-          <a:lstStyle/>
-          <a:p>
-            <a:endParaRPr lang="es-PY" dirty="0"/>
-          </a:p>
-        </p:txBody>
-      </p:sp>
+        </p:nvPicPr>
+        <p:blipFill rotWithShape="1">
+          <a:blip r:embed="rId2" cstate="print">
+            <a:extLst>
+              <a:ext uri="{28A0092B-C50C-407E-A947-70E740481C1C}">
+                <a14:useLocalDpi xmlns:a14="http://schemas.microsoft.com/office/drawing/2010/main" val="0"/>
+              </a:ext>
+            </a:extLst>
+          </a:blip>
+          <a:stretch/>
+        </p:blipFill>
+        <p:spPr bwMode="auto">
+          <a:xfrm>
+            <a:off x="457200" y="2491581"/>
+            <a:ext cx="8229600" cy="2743200"/>
+          </a:xfrm>
+          <a:prstGeom prst="rect">
+            <a:avLst/>
+          </a:prstGeom>
+          <a:noFill/>
+          <a:extLst>
+            <a:ext uri="{909E8E84-426E-40DD-AFC4-6F175D3DCCD1}">
+              <a14:hiddenFill xmlns:a14="http://schemas.microsoft.com/office/drawing/2010/main">
+                <a:solidFill>
+                  <a:srgbClr val="FFFFFF"/>
+                </a:solidFill>
+              </a14:hiddenFill>
+            </a:ext>
+          </a:extLst>
+        </p:spPr>
+      </p:pic>
     </p:spTree>
     <p:extLst>
       <p:ext uri="{BB962C8B-B14F-4D97-AF65-F5344CB8AC3E}">
@@ -3455,6 +3897,13 @@
   <p:clrMapOvr>
     <a:masterClrMapping/>
   </p:clrMapOvr>
+  <p:timing>
+    <p:tnLst>
+      <p:par>
+        <p:cTn id="1" dur="indefinite" restart="never" nodeType="tmRoot"/>
+      </p:par>
+    </p:tnLst>
+  </p:timing>
 </p:sld>
 </file>
 
@@ -3582,37 +4031,60 @@
           </a:p>
         </p:txBody>
       </p:sp>
-      <p:sp>
-        <p:nvSpPr>
-          <p:cNvPr id="3" name="2 Marcador de contenido"/>
-          <p:cNvSpPr>
-            <a:spLocks noGrp="1"/>
-          </p:cNvSpPr>
-          <p:nvPr>
-            <p:ph idx="1"/>
-          </p:nvPr>
-        </p:nvSpPr>
-        <p:spPr/>
-        <p:txBody>
-          <a:bodyPr/>
-          <a:lstStyle/>
-          <a:p>
-            <a:r>
-              <a:rPr lang="en-US" dirty="0" err="1" smtClean="0"/>
-              <a:t>Descripcion</a:t>
-            </a:r>
-            <a:r>
-              <a:rPr lang="en-US" dirty="0" smtClean="0"/>
-              <a:t> del </a:t>
-            </a:r>
-            <a:r>
-              <a:rPr lang="en-US" dirty="0" err="1" smtClean="0"/>
-              <a:t>programa</a:t>
-            </a:r>
-            <a:endParaRPr lang="es-PY" dirty="0"/>
-          </a:p>
-        </p:txBody>
-      </p:sp>
+      <p:pic>
+        <p:nvPicPr>
+          <p:cNvPr id="4098" name="Picture 2"/>
+          <p:cNvPicPr>
+            <a:picLocks noChangeAspect="1" noChangeArrowheads="1"/>
+          </p:cNvPicPr>
+          <p:nvPr/>
+        </p:nvPicPr>
+        <p:blipFill>
+          <a:blip r:embed="rId2">
+            <a:extLst>
+              <a:ext uri="{28A0092B-C50C-407E-A947-70E740481C1C}">
+                <a14:useLocalDpi xmlns:a14="http://schemas.microsoft.com/office/drawing/2010/main" val="0"/>
+              </a:ext>
+            </a:extLst>
+          </a:blip>
+          <a:srcRect/>
+          <a:stretch>
+            <a:fillRect/>
+          </a:stretch>
+        </p:blipFill>
+        <p:spPr bwMode="auto">
+          <a:xfrm>
+            <a:off x="179512" y="1484784"/>
+            <a:ext cx="8784976" cy="5112568"/>
+          </a:xfrm>
+          <a:prstGeom prst="rect">
+            <a:avLst/>
+          </a:prstGeom>
+          <a:noFill/>
+          <a:ln>
+            <a:noFill/>
+          </a:ln>
+          <a:extLst>
+            <a:ext uri="{909E8E84-426E-40DD-AFC4-6F175D3DCCD1}">
+              <a14:hiddenFill xmlns:a14="http://schemas.microsoft.com/office/drawing/2010/main">
+                <a:solidFill>
+                  <a:schemeClr val="accent1"/>
+                </a:solidFill>
+              </a14:hiddenFill>
+            </a:ext>
+            <a:ext uri="{91240B29-F687-4F45-9708-019B960494DF}">
+              <a14:hiddenLine xmlns:a14="http://schemas.microsoft.com/office/drawing/2010/main" w="9525">
+                <a:solidFill>
+                  <a:schemeClr val="tx1"/>
+                </a:solidFill>
+                <a:miter lim="800000"/>
+                <a:headEnd/>
+                <a:tailEnd/>
+              </a14:hiddenLine>
+            </a:ext>
+          </a:extLst>
+        </p:spPr>
+      </p:pic>
     </p:spTree>
     <p:extLst>
       <p:ext uri="{BB962C8B-B14F-4D97-AF65-F5344CB8AC3E}">
@@ -3623,13 +4095,20 @@
   <p:clrMapOvr>
     <a:masterClrMapping/>
   </p:clrMapOvr>
+  <p:timing>
+    <p:tnLst>
+      <p:par>
+        <p:cTn id="1" dur="indefinite" restart="never" nodeType="tmRoot"/>
+      </p:par>
+    </p:tnLst>
+  </p:timing>
 </p:sld>
 </file>
 
 <file path=ppt/theme/theme1.xml><?xml version="1.0" encoding="utf-8"?>
-<a:theme xmlns:a="http://schemas.openxmlformats.org/drawingml/2006/main" name="Tema de Office">
+<a:theme xmlns:a="http://schemas.openxmlformats.org/drawingml/2006/main" name="Ejecutivo">
   <a:themeElements>
-    <a:clrScheme name="Oficina">
+    <a:clrScheme name="Ejecutivo">
       <a:dk1>
         <a:sysClr val="windowText" lastClr="000000"/>
       </a:dk1>
@@ -3637,48 +4116,83 @@
         <a:sysClr val="window" lastClr="FFFFFF"/>
       </a:lt1>
       <a:dk2>
-        <a:srgbClr val="1F497D"/>
+        <a:srgbClr val="2F5897"/>
       </a:dk2>
       <a:lt2>
-        <a:srgbClr val="EEECE1"/>
+        <a:srgbClr val="E4E9EF"/>
       </a:lt2>
       <a:accent1>
-        <a:srgbClr val="4F81BD"/>
+        <a:srgbClr val="6076B4"/>
       </a:accent1>
       <a:accent2>
-        <a:srgbClr val="C0504D"/>
+        <a:srgbClr val="9C5252"/>
       </a:accent2>
       <a:accent3>
-        <a:srgbClr val="9BBB59"/>
+        <a:srgbClr val="E68422"/>
       </a:accent3>
       <a:accent4>
-        <a:srgbClr val="8064A2"/>
+        <a:srgbClr val="846648"/>
       </a:accent4>
       <a:accent5>
-        <a:srgbClr val="4BACC6"/>
+        <a:srgbClr val="63891F"/>
       </a:accent5>
       <a:accent6>
-        <a:srgbClr val="F79646"/>
+        <a:srgbClr val="758085"/>
       </a:accent6>
       <a:hlink>
-        <a:srgbClr val="0000FF"/>
+        <a:srgbClr val="3399FF"/>
       </a:hlink>
       <a:folHlink>
-        <a:srgbClr val="800080"/>
+        <a:srgbClr val="B2B2B2"/>
       </a:folHlink>
     </a:clrScheme>
-    <a:fontScheme name="Oficina">
+    <a:fontScheme name="Ejecutivo">
       <a:majorFont>
-        <a:latin typeface="Calibri"/>
+        <a:latin typeface="Century Gothic"/>
         <a:ea typeface=""/>
         <a:cs typeface=""/>
-        <a:font script="Jpan" typeface="ＭＳ Ｐゴシック"/>
+        <a:font script="Jpan" typeface="HGｺﾞｼｯｸM"/>
+        <a:font script="Hang" typeface="HY중고딕"/>
+        <a:font script="Hans" typeface="幼圆"/>
+        <a:font script="Hant" typeface="微軟正黑體"/>
+        <a:font script="Arab" typeface="Tahoma"/>
+        <a:font script="Hebr" typeface="Gisha"/>
+        <a:font script="Thai" typeface="DilleniaUPC"/>
+        <a:font script="Ethi" typeface="Nyala"/>
+        <a:font script="Beng" typeface="Vrinda"/>
+        <a:font script="Gujr" typeface="Shruti"/>
+        <a:font script="Khmr" typeface="DaunPenh"/>
+        <a:font script="Knda" typeface="Tunga"/>
+        <a:font script="Guru" typeface="Raavi"/>
+        <a:font script="Cans" typeface="Euphemia"/>
+        <a:font script="Cher" typeface="Plantagenet Cherokee"/>
+        <a:font script="Yiii" typeface="Microsoft Yi Baiti"/>
+        <a:font script="Tibt" typeface="Microsoft Himalaya"/>
+        <a:font script="Thaa" typeface="MV Boli"/>
+        <a:font script="Deva" typeface="Mangal"/>
+        <a:font script="Telu" typeface="Gautami"/>
+        <a:font script="Taml" typeface="Latha"/>
+        <a:font script="Syrc" typeface="Estrangelo Edessa"/>
+        <a:font script="Orya" typeface="Kalinga"/>
+        <a:font script="Mlym" typeface="Kartika"/>
+        <a:font script="Laoo" typeface="DokChampa"/>
+        <a:font script="Sinh" typeface="Iskoola Pota"/>
+        <a:font script="Mong" typeface="Mongolian Baiti"/>
+        <a:font script="Viet" typeface="Tahoma"/>
+        <a:font script="Uigh" typeface="Microsoft Uighur"/>
+        <a:font script="Geor" typeface="Sylfaen"/>
+      </a:majorFont>
+      <a:minorFont>
+        <a:latin typeface="Palatino Linotype"/>
+        <a:ea typeface=""/>
+        <a:cs typeface=""/>
+        <a:font script="Jpan" typeface="HGS明朝E"/>
         <a:font script="Hang" typeface="맑은 고딕"/>
         <a:font script="Hans" typeface="宋体"/>
         <a:font script="Hant" typeface="新細明體"/>
         <a:font script="Arab" typeface="Times New Roman"/>
         <a:font script="Hebr" typeface="Times New Roman"/>
-        <a:font script="Thai" typeface="Angsana New"/>
+        <a:font script="Thai" typeface="Browallia New"/>
         <a:font script="Ethi" typeface="Nyala"/>
         <a:font script="Beng" typeface="Vrinda"/>
         <a:font script="Gujr" typeface="Shruti"/>
@@ -3701,43 +4215,10 @@
         <a:font script="Mong" typeface="Mongolian Baiti"/>
         <a:font script="Viet" typeface="Times New Roman"/>
         <a:font script="Uigh" typeface="Microsoft Uighur"/>
-      </a:majorFont>
-      <a:minorFont>
-        <a:latin typeface="Calibri"/>
-        <a:ea typeface=""/>
-        <a:cs typeface=""/>
-        <a:font script="Jpan" typeface="ＭＳ Ｐゴシック"/>
-        <a:font script="Hang" typeface="맑은 고딕"/>
-        <a:font script="Hans" typeface="宋体"/>
-        <a:font script="Hant" typeface="新細明體"/>
-        <a:font script="Arab" typeface="Arial"/>
-        <a:font script="Hebr" typeface="Arial"/>
-        <a:font script="Thai" typeface="Cordia New"/>
-        <a:font script="Ethi" typeface="Nyala"/>
-        <a:font script="Beng" typeface="Vrinda"/>
-        <a:font script="Gujr" typeface="Shruti"/>
-        <a:font script="Khmr" typeface="DaunPenh"/>
-        <a:font script="Knda" typeface="Tunga"/>
-        <a:font script="Guru" typeface="Raavi"/>
-        <a:font script="Cans" typeface="Euphemia"/>
-        <a:font script="Cher" typeface="Plantagenet Cherokee"/>
-        <a:font script="Yiii" typeface="Microsoft Yi Baiti"/>
-        <a:font script="Tibt" typeface="Microsoft Himalaya"/>
-        <a:font script="Thaa" typeface="MV Boli"/>
-        <a:font script="Deva" typeface="Mangal"/>
-        <a:font script="Telu" typeface="Gautami"/>
-        <a:font script="Taml" typeface="Latha"/>
-        <a:font script="Syrc" typeface="Estrangelo Edessa"/>
-        <a:font script="Orya" typeface="Kalinga"/>
-        <a:font script="Mlym" typeface="Kartika"/>
-        <a:font script="Laoo" typeface="DokChampa"/>
-        <a:font script="Sinh" typeface="Iskoola Pota"/>
-        <a:font script="Mong" typeface="Mongolian Baiti"/>
-        <a:font script="Viet" typeface="Arial"/>
-        <a:font script="Uigh" typeface="Microsoft Uighur"/>
+        <a:font script="Geor" typeface="Sylfaen"/>
       </a:minorFont>
     </a:fontScheme>
-    <a:fmtScheme name="Oficina">
+    <a:fmtScheme name="Ejecutivo">
       <a:fillStyleLst>
         <a:solidFill>
           <a:schemeClr val="phClr"/>
@@ -3799,13 +4280,13 @@
           </a:solidFill>
           <a:prstDash val="solid"/>
         </a:ln>
-        <a:ln w="25400" cap="flat" cmpd="sng" algn="ctr">
+        <a:ln w="28575" cap="flat" cmpd="sng" algn="ctr">
           <a:solidFill>
             <a:schemeClr val="phClr"/>
           </a:solidFill>
           <a:prstDash val="solid"/>
         </a:ln>
-        <a:ln w="38100" cap="flat" cmpd="sng" algn="ctr">
+        <a:ln w="50800" cap="flat" cmpd="sng" algn="ctr">
           <a:solidFill>
             <a:schemeClr val="phClr"/>
           </a:solidFill>
@@ -3858,42 +4339,24 @@
         </a:solidFill>
         <a:gradFill rotWithShape="1">
           <a:gsLst>
-            <a:gs pos="0">
+            <a:gs pos="50000">
               <a:schemeClr val="phClr">
-                <a:tint val="40000"/>
-                <a:satMod val="350000"/>
+                <a:tint val="80000"/>
+                <a:satMod val="250000"/>
               </a:schemeClr>
             </a:gs>
-            <a:gs pos="40000">
+            <a:gs pos="76000">
               <a:schemeClr val="phClr">
-                <a:tint val="45000"/>
-                <a:shade val="99000"/>
-                <a:satMod val="350000"/>
+                <a:tint val="90000"/>
+                <a:shade val="90000"/>
+                <a:satMod val="200000"/>
               </a:schemeClr>
             </a:gs>
-            <a:gs pos="100000">
+            <a:gs pos="92000">
               <a:schemeClr val="phClr">
-                <a:shade val="20000"/>
-                <a:satMod val="255000"/>
-              </a:schemeClr>
-            </a:gs>
-          </a:gsLst>
-          <a:path path="circle">
-            <a:fillToRect l="50000" t="-80000" r="50000" b="180000"/>
-          </a:path>
-        </a:gradFill>
-        <a:gradFill rotWithShape="1">
-          <a:gsLst>
-            <a:gs pos="0">
-              <a:schemeClr val="phClr">
-                <a:tint val="80000"/>
-                <a:satMod val="300000"/>
-              </a:schemeClr>
-            </a:gs>
-            <a:gs pos="100000">
-              <a:schemeClr val="phClr">
-                <a:shade val="30000"/>
-                <a:satMod val="200000"/>
+                <a:tint val="90000"/>
+                <a:shade val="70000"/>
+                <a:satMod val="250000"/>
               </a:schemeClr>
             </a:gs>
           </a:gsLst>
@@ -3901,6 +4364,19 @@
             <a:fillToRect l="50000" t="50000" r="50000" b="50000"/>
           </a:path>
         </a:gradFill>
+        <a:blipFill>
+          <a:blip xmlns:r="http://schemas.openxmlformats.org/officeDocument/2006/relationships" r:embed="rId1">
+            <a:duotone>
+              <a:schemeClr val="phClr">
+                <a:tint val="95000"/>
+              </a:schemeClr>
+              <a:schemeClr val="phClr">
+                <a:shade val="90000"/>
+              </a:schemeClr>
+            </a:duotone>
+          </a:blip>
+          <a:tile tx="0" ty="0" sx="100000" sy="100000" flip="none" algn="tl"/>
+        </a:blipFill>
       </a:bgFillStyleLst>
     </a:fmtScheme>
   </a:themeElements>

</xml_diff>